<commit_message>
Se termino el caso 7
</commit_message>
<xml_diff>
--- a/datos/DiagramaAlgoritmo.pptx
+++ b/datos/DiagramaAlgoritmo.pptx
@@ -286,7 +286,7 @@
           <a:p>
             <a:fld id="{9DA5C79F-2E3E-4F45-BFFD-84CC133900D2}" type="datetimeFigureOut">
               <a:rPr lang="es-PA" smtClean="0"/>
-              <a:t>04/mar.2022</a:t>
+              <a:t>05/mar.2022</a:t>
             </a:fld>
             <a:endParaRPr lang="es-PA"/>
           </a:p>
@@ -486,7 +486,7 @@
           <a:p>
             <a:fld id="{9DA5C79F-2E3E-4F45-BFFD-84CC133900D2}" type="datetimeFigureOut">
               <a:rPr lang="es-PA" smtClean="0"/>
-              <a:t>04/mar.2022</a:t>
+              <a:t>05/mar.2022</a:t>
             </a:fld>
             <a:endParaRPr lang="es-PA"/>
           </a:p>
@@ -696,7 +696,7 @@
           <a:p>
             <a:fld id="{9DA5C79F-2E3E-4F45-BFFD-84CC133900D2}" type="datetimeFigureOut">
               <a:rPr lang="es-PA" smtClean="0"/>
-              <a:t>04/mar.2022</a:t>
+              <a:t>05/mar.2022</a:t>
             </a:fld>
             <a:endParaRPr lang="es-PA"/>
           </a:p>
@@ -896,7 +896,7 @@
           <a:p>
             <a:fld id="{9DA5C79F-2E3E-4F45-BFFD-84CC133900D2}" type="datetimeFigureOut">
               <a:rPr lang="es-PA" smtClean="0"/>
-              <a:t>04/mar.2022</a:t>
+              <a:t>05/mar.2022</a:t>
             </a:fld>
             <a:endParaRPr lang="es-PA"/>
           </a:p>
@@ -1172,7 +1172,7 @@
           <a:p>
             <a:fld id="{9DA5C79F-2E3E-4F45-BFFD-84CC133900D2}" type="datetimeFigureOut">
               <a:rPr lang="es-PA" smtClean="0"/>
-              <a:t>04/mar.2022</a:t>
+              <a:t>05/mar.2022</a:t>
             </a:fld>
             <a:endParaRPr lang="es-PA"/>
           </a:p>
@@ -1440,7 +1440,7 @@
           <a:p>
             <a:fld id="{9DA5C79F-2E3E-4F45-BFFD-84CC133900D2}" type="datetimeFigureOut">
               <a:rPr lang="es-PA" smtClean="0"/>
-              <a:t>04/mar.2022</a:t>
+              <a:t>05/mar.2022</a:t>
             </a:fld>
             <a:endParaRPr lang="es-PA"/>
           </a:p>
@@ -1855,7 +1855,7 @@
           <a:p>
             <a:fld id="{9DA5C79F-2E3E-4F45-BFFD-84CC133900D2}" type="datetimeFigureOut">
               <a:rPr lang="es-PA" smtClean="0"/>
-              <a:t>04/mar.2022</a:t>
+              <a:t>05/mar.2022</a:t>
             </a:fld>
             <a:endParaRPr lang="es-PA"/>
           </a:p>
@@ -1997,7 +1997,7 @@
           <a:p>
             <a:fld id="{9DA5C79F-2E3E-4F45-BFFD-84CC133900D2}" type="datetimeFigureOut">
               <a:rPr lang="es-PA" smtClean="0"/>
-              <a:t>04/mar.2022</a:t>
+              <a:t>05/mar.2022</a:t>
             </a:fld>
             <a:endParaRPr lang="es-PA"/>
           </a:p>
@@ -2110,7 +2110,7 @@
           <a:p>
             <a:fld id="{9DA5C79F-2E3E-4F45-BFFD-84CC133900D2}" type="datetimeFigureOut">
               <a:rPr lang="es-PA" smtClean="0"/>
-              <a:t>04/mar.2022</a:t>
+              <a:t>05/mar.2022</a:t>
             </a:fld>
             <a:endParaRPr lang="es-PA"/>
           </a:p>
@@ -2423,7 +2423,7 @@
           <a:p>
             <a:fld id="{9DA5C79F-2E3E-4F45-BFFD-84CC133900D2}" type="datetimeFigureOut">
               <a:rPr lang="es-PA" smtClean="0"/>
-              <a:t>04/mar.2022</a:t>
+              <a:t>05/mar.2022</a:t>
             </a:fld>
             <a:endParaRPr lang="es-PA"/>
           </a:p>
@@ -2712,7 +2712,7 @@
           <a:p>
             <a:fld id="{9DA5C79F-2E3E-4F45-BFFD-84CC133900D2}" type="datetimeFigureOut">
               <a:rPr lang="es-PA" smtClean="0"/>
-              <a:t>04/mar.2022</a:t>
+              <a:t>05/mar.2022</a:t>
             </a:fld>
             <a:endParaRPr lang="es-PA"/>
           </a:p>
@@ -2955,7 +2955,7 @@
           <a:p>
             <a:fld id="{9DA5C79F-2E3E-4F45-BFFD-84CC133900D2}" type="datetimeFigureOut">
               <a:rPr lang="es-PA" smtClean="0"/>
-              <a:t>04/mar.2022</a:t>
+              <a:t>05/mar.2022</a:t>
             </a:fld>
             <a:endParaRPr lang="es-PA"/>
           </a:p>
@@ -5019,7 +5019,7 @@
         </p:nvSpPr>
         <p:spPr>
           <a:xfrm>
-            <a:off x="591670" y="376518"/>
+            <a:off x="177089" y="379990"/>
             <a:ext cx="1208555" cy="614082"/>
           </a:xfrm>
           <a:prstGeom prst="flowChartAlternateProcess">
@@ -5111,7 +5111,7 @@
         </p:nvSpPr>
         <p:spPr>
           <a:xfrm>
-            <a:off x="1800225" y="3122295"/>
+            <a:off x="1055058" y="3125767"/>
             <a:ext cx="1400175" cy="613410"/>
           </a:xfrm>
           <a:prstGeom prst="flowChartAlternateProcess">
@@ -5228,8 +5228,8 @@
         </p:nvCxnSpPr>
         <p:spPr>
           <a:xfrm rot="16200000" flipH="1">
-            <a:off x="278886" y="1907661"/>
-            <a:ext cx="2438400" cy="604277"/>
+            <a:off x="-300988" y="2076426"/>
+            <a:ext cx="2438400" cy="273691"/>
           </a:xfrm>
           <a:prstGeom prst="bentConnector2">
             <a:avLst/>
@@ -5267,7 +5267,7 @@
         </p:nvSpPr>
         <p:spPr>
           <a:xfrm>
-            <a:off x="4026007" y="1103538"/>
+            <a:off x="3148038" y="1103538"/>
             <a:ext cx="1038225" cy="438150"/>
           </a:xfrm>
           <a:prstGeom prst="flowChartTerminator">
@@ -5349,7 +5349,7 @@
         </p:nvCxnSpPr>
         <p:spPr>
           <a:xfrm>
-            <a:off x="5064232" y="1322613"/>
+            <a:off x="4186263" y="1322613"/>
             <a:ext cx="595485" cy="3585"/>
           </a:xfrm>
           <a:prstGeom prst="bentConnector3">
@@ -5392,8 +5392,8 @@
         </p:nvCxnSpPr>
         <p:spPr>
           <a:xfrm flipV="1">
-            <a:off x="3200400" y="1322613"/>
-            <a:ext cx="825607" cy="2106387"/>
+            <a:off x="2455233" y="1322613"/>
+            <a:ext cx="692805" cy="2109859"/>
           </a:xfrm>
           <a:prstGeom prst="bentConnector3">
             <a:avLst/>
@@ -5431,7 +5431,7 @@
         </p:nvSpPr>
         <p:spPr>
           <a:xfrm>
-            <a:off x="7648233" y="1104220"/>
+            <a:off x="6770264" y="1104220"/>
             <a:ext cx="1152352" cy="438150"/>
           </a:xfrm>
           <a:prstGeom prst="flowChartOnlineStorage">
@@ -5513,7 +5513,7 @@
         </p:nvCxnSpPr>
         <p:spPr>
           <a:xfrm flipV="1">
-            <a:off x="6812069" y="1323295"/>
+            <a:off x="5934100" y="1323295"/>
             <a:ext cx="836164" cy="2903"/>
           </a:xfrm>
           <a:prstGeom prst="bentConnector3">
@@ -5552,7 +5552,7 @@
         </p:nvSpPr>
         <p:spPr>
           <a:xfrm>
-            <a:off x="9231678" y="1103538"/>
+            <a:off x="8353709" y="1103538"/>
             <a:ext cx="1009650" cy="438150"/>
           </a:xfrm>
           <a:prstGeom prst="flowChartProcess">
@@ -5632,7 +5632,7 @@
         </p:nvCxnSpPr>
         <p:spPr>
           <a:xfrm flipV="1">
-            <a:off x="8608526" y="1322613"/>
+            <a:off x="7730557" y="1322613"/>
             <a:ext cx="623152" cy="682"/>
           </a:xfrm>
           <a:prstGeom prst="straightConnector1">
@@ -5671,7 +5671,7 @@
         </p:nvSpPr>
         <p:spPr>
           <a:xfrm>
-            <a:off x="4026007" y="3209922"/>
+            <a:off x="3148038" y="3209922"/>
             <a:ext cx="1038225" cy="438150"/>
           </a:xfrm>
           <a:prstGeom prst="flowChartTerminator">
@@ -5753,8 +5753,8 @@
         </p:nvCxnSpPr>
         <p:spPr>
           <a:xfrm flipV="1">
-            <a:off x="3200400" y="3428997"/>
-            <a:ext cx="825607" cy="3"/>
+            <a:off x="2455233" y="3428997"/>
+            <a:ext cx="692805" cy="3475"/>
           </a:xfrm>
           <a:prstGeom prst="bentConnector3">
             <a:avLst/>
@@ -5792,7 +5792,7 @@
         </p:nvSpPr>
         <p:spPr>
           <a:xfrm>
-            <a:off x="5723303" y="3083857"/>
+            <a:off x="4845334" y="3083857"/>
             <a:ext cx="1729854" cy="655320"/>
           </a:xfrm>
           <a:prstGeom prst="flowChartPreparation">
@@ -5888,7 +5888,7 @@
         </p:nvCxnSpPr>
         <p:spPr>
           <a:xfrm flipV="1">
-            <a:off x="5064232" y="3411517"/>
+            <a:off x="4186263" y="3411517"/>
             <a:ext cx="659071" cy="17480"/>
           </a:xfrm>
           <a:prstGeom prst="bentConnector3">
@@ -5927,7 +5927,7 @@
         </p:nvSpPr>
         <p:spPr>
           <a:xfrm>
-            <a:off x="4004041" y="5339666"/>
+            <a:off x="3126072" y="5339666"/>
             <a:ext cx="1038225" cy="438150"/>
           </a:xfrm>
           <a:prstGeom prst="flowChartTerminator">
@@ -6009,8 +6009,8 @@
         </p:nvCxnSpPr>
         <p:spPr>
           <a:xfrm>
-            <a:off x="3200400" y="3429000"/>
-            <a:ext cx="803641" cy="2129741"/>
+            <a:off x="2455233" y="3432472"/>
+            <a:ext cx="670839" cy="2126269"/>
           </a:xfrm>
           <a:prstGeom prst="bentConnector3">
             <a:avLst/>
@@ -6048,7 +6048,7 @@
         </p:nvSpPr>
         <p:spPr>
           <a:xfrm>
-            <a:off x="5723303" y="4912301"/>
+            <a:off x="4845334" y="4912301"/>
             <a:ext cx="1729853" cy="576599"/>
           </a:xfrm>
           <a:prstGeom prst="flowChartPreparation">
@@ -6143,7 +6143,7 @@
         </p:nvCxnSpPr>
         <p:spPr>
           <a:xfrm flipV="1">
-            <a:off x="5042266" y="5200601"/>
+            <a:off x="4164297" y="5200601"/>
             <a:ext cx="681037" cy="358140"/>
           </a:xfrm>
           <a:prstGeom prst="bentConnector3">
@@ -6184,7 +6184,7 @@
         </p:nvSpPr>
         <p:spPr>
           <a:xfrm>
-            <a:off x="5745266" y="5798771"/>
+            <a:off x="4867297" y="5798771"/>
             <a:ext cx="1685925" cy="576599"/>
           </a:xfrm>
           <a:prstGeom prst="flowChartPreparation">
@@ -6276,7 +6276,7 @@
         </p:nvSpPr>
         <p:spPr>
           <a:xfrm>
-            <a:off x="7842961" y="5813395"/>
+            <a:off x="6964992" y="5813395"/>
             <a:ext cx="1152352" cy="561975"/>
           </a:xfrm>
           <a:prstGeom prst="flowChartProcess">
@@ -6366,7 +6366,7 @@
         </p:nvSpPr>
         <p:spPr>
           <a:xfrm>
-            <a:off x="9424111" y="5878165"/>
+            <a:off x="8546142" y="5878165"/>
             <a:ext cx="1152352" cy="438150"/>
           </a:xfrm>
           <a:prstGeom prst="flowChartOnlineStorage">
@@ -6447,7 +6447,7 @@
         </p:nvCxnSpPr>
         <p:spPr>
           <a:xfrm>
-            <a:off x="8995313" y="6094383"/>
+            <a:off x="8117344" y="6094383"/>
             <a:ext cx="428798" cy="2857"/>
           </a:xfrm>
           <a:prstGeom prst="straightConnector1">
@@ -6486,7 +6486,7 @@
         </p:nvSpPr>
         <p:spPr>
           <a:xfrm>
-            <a:off x="11005261" y="5875924"/>
+            <a:off x="10127292" y="5875924"/>
             <a:ext cx="1009650" cy="438150"/>
           </a:xfrm>
           <a:prstGeom prst="flowChartProcess">
@@ -6565,7 +6565,7 @@
         </p:nvCxnSpPr>
         <p:spPr>
           <a:xfrm flipV="1">
-            <a:off x="10384404" y="6094999"/>
+            <a:off x="9506435" y="6094999"/>
             <a:ext cx="620857" cy="2241"/>
           </a:xfrm>
           <a:prstGeom prst="straightConnector1">
@@ -6607,7 +6607,7 @@
         </p:nvCxnSpPr>
         <p:spPr>
           <a:xfrm>
-            <a:off x="7431191" y="6087071"/>
+            <a:off x="6553222" y="6087071"/>
             <a:ext cx="411770" cy="7312"/>
           </a:xfrm>
           <a:prstGeom prst="straightConnector1">
@@ -6646,7 +6646,7 @@
         </p:nvSpPr>
         <p:spPr>
           <a:xfrm>
-            <a:off x="5659717" y="1045210"/>
+            <a:off x="4781748" y="1045210"/>
             <a:ext cx="1152352" cy="561975"/>
           </a:xfrm>
           <a:prstGeom prst="flowChartProcess">
@@ -6736,7 +6736,7 @@
         </p:nvSpPr>
         <p:spPr>
           <a:xfrm>
-            <a:off x="7842961" y="3129074"/>
+            <a:off x="6964992" y="3129074"/>
             <a:ext cx="1152352" cy="561975"/>
           </a:xfrm>
           <a:prstGeom prst="flowChartProcess">
@@ -6826,7 +6826,7 @@
         </p:nvSpPr>
         <p:spPr>
           <a:xfrm>
-            <a:off x="9424111" y="3193844"/>
+            <a:off x="8546142" y="3193844"/>
             <a:ext cx="1152352" cy="438150"/>
           </a:xfrm>
           <a:prstGeom prst="flowChartOnlineStorage">
@@ -6907,7 +6907,7 @@
         </p:nvCxnSpPr>
         <p:spPr>
           <a:xfrm>
-            <a:off x="8995313" y="3410062"/>
+            <a:off x="8117344" y="3410062"/>
             <a:ext cx="428798" cy="2857"/>
           </a:xfrm>
           <a:prstGeom prst="straightConnector1">
@@ -6946,7 +6946,7 @@
         </p:nvSpPr>
         <p:spPr>
           <a:xfrm>
-            <a:off x="11005261" y="3191603"/>
+            <a:off x="10127292" y="3191603"/>
             <a:ext cx="1009650" cy="438150"/>
           </a:xfrm>
           <a:prstGeom prst="flowChartProcess">
@@ -7025,7 +7025,7 @@
         </p:nvCxnSpPr>
         <p:spPr>
           <a:xfrm flipV="1">
-            <a:off x="10384404" y="3410678"/>
+            <a:off x="9506435" y="3410678"/>
             <a:ext cx="620857" cy="2241"/>
           </a:xfrm>
           <a:prstGeom prst="straightConnector1">
@@ -7067,7 +7067,7 @@
         </p:nvCxnSpPr>
         <p:spPr>
           <a:xfrm flipV="1">
-            <a:off x="7453157" y="3410062"/>
+            <a:off x="6575188" y="3410062"/>
             <a:ext cx="389804" cy="1455"/>
           </a:xfrm>
           <a:prstGeom prst="straightConnector1">
@@ -7109,7 +7109,7 @@
         </p:nvCxnSpPr>
         <p:spPr>
           <a:xfrm flipH="1">
-            <a:off x="6588229" y="5488900"/>
+            <a:off x="5710260" y="5488900"/>
             <a:ext cx="1" cy="309871"/>
           </a:xfrm>
           <a:prstGeom prst="straightConnector1">
@@ -7270,7 +7270,7 @@
         </p:nvSpPr>
         <p:spPr>
           <a:xfrm>
-            <a:off x="1363306" y="1851183"/>
+            <a:off x="1528147" y="1667827"/>
             <a:ext cx="1619250" cy="613410"/>
           </a:xfrm>
           <a:prstGeom prst="flowChartAlternateProcess">
@@ -7864,8 +7864,8 @@
         </p:nvCxnSpPr>
         <p:spPr>
           <a:xfrm rot="16200000" flipH="1">
-            <a:off x="695983" y="1490565"/>
-            <a:ext cx="1167288" cy="167358"/>
+            <a:off x="870081" y="1316466"/>
+            <a:ext cx="983932" cy="332199"/>
           </a:xfrm>
           <a:prstGeom prst="bentConnector2">
             <a:avLst/>
@@ -8053,49 +8053,6 @@
       </p:sp>
       <p:cxnSp>
         <p:nvCxnSpPr>
-          <p:cNvPr id="69" name="Conector: angular 68">
-            <a:extLst>
-              <a:ext uri="{FF2B5EF4-FFF2-40B4-BE49-F238E27FC236}">
-                <a16:creationId xmlns:a16="http://schemas.microsoft.com/office/drawing/2014/main" id="{3D99DBBD-E68D-4A96-A74A-3BAC412FA4BB}"/>
-              </a:ext>
-            </a:extLst>
-          </p:cNvPr>
-          <p:cNvCxnSpPr>
-            <a:cxnSpLocks/>
-            <a:stCxn id="59" idx="3"/>
-            <a:endCxn id="57" idx="1"/>
-          </p:cNvCxnSpPr>
-          <p:nvPr/>
-        </p:nvCxnSpPr>
-        <p:spPr>
-          <a:xfrm>
-            <a:off x="4840996" y="464484"/>
-            <a:ext cx="595485" cy="3585"/>
-          </a:xfrm>
-          <a:prstGeom prst="bentConnector3">
-            <a:avLst/>
-          </a:prstGeom>
-          <a:ln>
-            <a:tailEnd type="triangle"/>
-          </a:ln>
-        </p:spPr>
-        <p:style>
-          <a:lnRef idx="1">
-            <a:schemeClr val="accent1"/>
-          </a:lnRef>
-          <a:fillRef idx="0">
-            <a:schemeClr val="accent1"/>
-          </a:fillRef>
-          <a:effectRef idx="0">
-            <a:schemeClr val="accent1"/>
-          </a:effectRef>
-          <a:fontRef idx="minor">
-            <a:schemeClr val="tx1"/>
-          </a:fontRef>
-        </p:style>
-      </p:cxnSp>
-      <p:cxnSp>
-        <p:nvCxnSpPr>
           <p:cNvPr id="74" name="Conector: angular 73">
             <a:extLst>
               <a:ext uri="{FF2B5EF4-FFF2-40B4-BE49-F238E27FC236}">
@@ -8112,8 +8069,8 @@
         </p:nvCxnSpPr>
         <p:spPr>
           <a:xfrm flipV="1">
-            <a:off x="2982556" y="464484"/>
-            <a:ext cx="820215" cy="1693404"/>
+            <a:off x="3147397" y="464484"/>
+            <a:ext cx="655374" cy="1510048"/>
           </a:xfrm>
           <a:prstGeom prst="bentConnector3">
             <a:avLst/>
@@ -8151,7 +8108,7 @@
         </p:nvSpPr>
         <p:spPr>
           <a:xfrm>
-            <a:off x="7424997" y="246091"/>
+            <a:off x="8863631" y="246311"/>
             <a:ext cx="1152352" cy="438150"/>
           </a:xfrm>
           <a:prstGeom prst="flowChartOnlineStorage">
@@ -8233,8 +8190,8 @@
         </p:nvCxnSpPr>
         <p:spPr>
           <a:xfrm flipV="1">
-            <a:off x="6588833" y="465166"/>
-            <a:ext cx="836164" cy="2903"/>
+            <a:off x="8382273" y="465386"/>
+            <a:ext cx="481358" cy="2903"/>
           </a:xfrm>
           <a:prstGeom prst="bentConnector3">
             <a:avLst/>
@@ -8272,7 +8229,7 @@
         </p:nvSpPr>
         <p:spPr>
           <a:xfrm>
-            <a:off x="9008442" y="245409"/>
+            <a:off x="10590680" y="240710"/>
             <a:ext cx="1009650" cy="438150"/>
           </a:xfrm>
           <a:prstGeom prst="flowChartProcess">
@@ -8352,8 +8309,8 @@
         </p:nvCxnSpPr>
         <p:spPr>
           <a:xfrm flipV="1">
-            <a:off x="8385290" y="464484"/>
-            <a:ext cx="623152" cy="682"/>
+            <a:off x="9823924" y="459785"/>
+            <a:ext cx="766756" cy="5601"/>
           </a:xfrm>
           <a:prstGeom prst="straightConnector1">
             <a:avLst/>
@@ -8472,9 +8429,9 @@
           <p:nvPr/>
         </p:nvCxnSpPr>
         <p:spPr>
-          <a:xfrm flipV="1">
-            <a:off x="2982556" y="1974532"/>
-            <a:ext cx="820215" cy="183356"/>
+          <a:xfrm>
+            <a:off x="3147397" y="1974532"/>
+            <a:ext cx="655374" cy="12700"/>
           </a:xfrm>
           <a:prstGeom prst="bentConnector3">
             <a:avLst/>
@@ -8512,7 +8469,7 @@
         </p:nvSpPr>
         <p:spPr>
           <a:xfrm>
-            <a:off x="5522033" y="1100137"/>
+            <a:off x="5244883" y="1642807"/>
             <a:ext cx="1729854" cy="655320"/>
           </a:xfrm>
           <a:prstGeom prst="flowChartPreparation">
@@ -8608,8 +8565,8 @@
         </p:nvCxnSpPr>
         <p:spPr>
           <a:xfrm flipV="1">
-            <a:off x="4840996" y="1427797"/>
-            <a:ext cx="681037" cy="546735"/>
+            <a:off x="4840996" y="1970467"/>
+            <a:ext cx="403887" cy="4065"/>
           </a:xfrm>
           <a:prstGeom prst="bentConnector3">
             <a:avLst/>
@@ -8729,8 +8686,8 @@
         </p:nvCxnSpPr>
         <p:spPr>
           <a:xfrm>
-            <a:off x="2982556" y="2157888"/>
-            <a:ext cx="820215" cy="1629252"/>
+            <a:off x="3147397" y="1974532"/>
+            <a:ext cx="655374" cy="1812608"/>
           </a:xfrm>
           <a:prstGeom prst="bentConnector3">
             <a:avLst>
@@ -9368,7 +9325,7 @@
         </p:nvSpPr>
         <p:spPr>
           <a:xfrm>
-            <a:off x="5436481" y="187081"/>
+            <a:off x="7229921" y="187301"/>
             <a:ext cx="1152352" cy="561975"/>
           </a:xfrm>
           <a:prstGeom prst="flowChartProcess">
@@ -9458,7 +9415,7 @@
         </p:nvSpPr>
         <p:spPr>
           <a:xfrm>
-            <a:off x="7641691" y="1145354"/>
+            <a:off x="7364541" y="1688024"/>
             <a:ext cx="1152352" cy="561975"/>
           </a:xfrm>
           <a:prstGeom prst="flowChartProcess">
@@ -9548,7 +9505,7 @@
         </p:nvSpPr>
         <p:spPr>
           <a:xfrm>
-            <a:off x="9222841" y="1210124"/>
+            <a:off x="8945691" y="1752794"/>
             <a:ext cx="1152352" cy="438150"/>
           </a:xfrm>
           <a:prstGeom prst="flowChartOnlineStorage">
@@ -9629,7 +9586,7 @@
         </p:nvCxnSpPr>
         <p:spPr>
           <a:xfrm>
-            <a:off x="8794043" y="1426342"/>
+            <a:off x="8516893" y="1969012"/>
             <a:ext cx="428798" cy="2857"/>
           </a:xfrm>
           <a:prstGeom prst="straightConnector1">
@@ -9668,7 +9625,7 @@
         </p:nvSpPr>
         <p:spPr>
           <a:xfrm>
-            <a:off x="10803991" y="1207883"/>
+            <a:off x="10526841" y="1750553"/>
             <a:ext cx="1009650" cy="438150"/>
           </a:xfrm>
           <a:prstGeom prst="flowChartProcess">
@@ -9747,7 +9704,7 @@
         </p:nvCxnSpPr>
         <p:spPr>
           <a:xfrm flipV="1">
-            <a:off x="10183134" y="1426958"/>
+            <a:off x="9905984" y="1969628"/>
             <a:ext cx="620857" cy="2241"/>
           </a:xfrm>
           <a:prstGeom prst="straightConnector1">
@@ -9789,7 +9746,7 @@
         </p:nvCxnSpPr>
         <p:spPr>
           <a:xfrm flipV="1">
-            <a:off x="7251887" y="1426342"/>
+            <a:off x="6974737" y="1969012"/>
             <a:ext cx="389804" cy="1455"/>
           </a:xfrm>
           <a:prstGeom prst="straightConnector1">
@@ -9833,6 +9790,139 @@
           <a:xfrm flipH="1">
             <a:off x="6386959" y="3717299"/>
             <a:ext cx="1" cy="309871"/>
+          </a:xfrm>
+          <a:prstGeom prst="straightConnector1">
+            <a:avLst/>
+          </a:prstGeom>
+          <a:ln>
+            <a:tailEnd type="triangle"/>
+          </a:ln>
+        </p:spPr>
+        <p:style>
+          <a:lnRef idx="1">
+            <a:schemeClr val="accent1"/>
+          </a:lnRef>
+          <a:fillRef idx="0">
+            <a:schemeClr val="accent1"/>
+          </a:fillRef>
+          <a:effectRef idx="0">
+            <a:schemeClr val="accent1"/>
+          </a:effectRef>
+          <a:fontRef idx="minor">
+            <a:schemeClr val="tx1"/>
+          </a:fontRef>
+        </p:style>
+      </p:cxnSp>
+      <p:sp>
+        <p:nvSpPr>
+          <p:cNvPr id="43" name="Diagrama de flujo: preparación 42">
+            <a:extLst>
+              <a:ext uri="{FF2B5EF4-FFF2-40B4-BE49-F238E27FC236}">
+                <a16:creationId xmlns:a16="http://schemas.microsoft.com/office/drawing/2014/main" id="{B5BE8293-1A44-40C0-8C34-9059D15C8AF4}"/>
+              </a:ext>
+            </a:extLst>
+          </p:cNvPr>
+          <p:cNvSpPr/>
+          <p:nvPr/>
+        </p:nvSpPr>
+        <p:spPr>
+          <a:xfrm>
+            <a:off x="5244883" y="76880"/>
+            <a:ext cx="1581150" cy="765810"/>
+          </a:xfrm>
+          <a:prstGeom prst="flowChartPreparation">
+            <a:avLst/>
+          </a:prstGeom>
+        </p:spPr>
+        <p:style>
+          <a:lnRef idx="2">
+            <a:schemeClr val="accent6">
+              <a:shade val="50000"/>
+            </a:schemeClr>
+          </a:lnRef>
+          <a:fillRef idx="1">
+            <a:schemeClr val="accent6"/>
+          </a:fillRef>
+          <a:effectRef idx="0">
+            <a:schemeClr val="accent6"/>
+          </a:effectRef>
+          <a:fontRef idx="minor">
+            <a:schemeClr val="lt1"/>
+          </a:fontRef>
+        </p:style>
+        <p:txBody>
+          <a:bodyPr rtlCol="0" anchor="ctr"/>
+          <a:lstStyle/>
+          <a:p>
+            <a:pPr algn="ctr"/>
+            <a:r>
+              <a:rPr lang="es-PA" sz="1200" dirty="0"/>
+              <a:t>interpolacionVelocidadMetodo2</a:t>
+            </a:r>
+          </a:p>
+        </p:txBody>
+      </p:sp>
+      <p:cxnSp>
+        <p:nvCxnSpPr>
+          <p:cNvPr id="5" name="Conector recto de flecha 4">
+            <a:extLst>
+              <a:ext uri="{FF2B5EF4-FFF2-40B4-BE49-F238E27FC236}">
+                <a16:creationId xmlns:a16="http://schemas.microsoft.com/office/drawing/2014/main" id="{AD535E6B-F4DF-4DAF-954D-04A0B4A94789}"/>
+              </a:ext>
+            </a:extLst>
+          </p:cNvPr>
+          <p:cNvCxnSpPr>
+            <a:stCxn id="59" idx="3"/>
+            <a:endCxn id="43" idx="1"/>
+          </p:cNvCxnSpPr>
+          <p:nvPr/>
+        </p:nvCxnSpPr>
+        <p:spPr>
+          <a:xfrm flipV="1">
+            <a:off x="4840996" y="459785"/>
+            <a:ext cx="403887" cy="4699"/>
+          </a:xfrm>
+          <a:prstGeom prst="straightConnector1">
+            <a:avLst/>
+          </a:prstGeom>
+          <a:ln>
+            <a:tailEnd type="triangle"/>
+          </a:ln>
+        </p:spPr>
+        <p:style>
+          <a:lnRef idx="1">
+            <a:schemeClr val="accent1"/>
+          </a:lnRef>
+          <a:fillRef idx="0">
+            <a:schemeClr val="accent1"/>
+          </a:fillRef>
+          <a:effectRef idx="0">
+            <a:schemeClr val="accent1"/>
+          </a:effectRef>
+          <a:fontRef idx="minor">
+            <a:schemeClr val="tx1"/>
+          </a:fontRef>
+        </p:style>
+      </p:cxnSp>
+      <p:cxnSp>
+        <p:nvCxnSpPr>
+          <p:cNvPr id="8" name="Conector recto de flecha 7">
+            <a:extLst>
+              <a:ext uri="{FF2B5EF4-FFF2-40B4-BE49-F238E27FC236}">
+                <a16:creationId xmlns:a16="http://schemas.microsoft.com/office/drawing/2014/main" id="{6EAB8525-F1AD-457A-900C-B6E2E350AFDA}"/>
+              </a:ext>
+            </a:extLst>
+          </p:cNvPr>
+          <p:cNvCxnSpPr>
+            <a:stCxn id="43" idx="3"/>
+            <a:endCxn id="57" idx="1"/>
+          </p:cNvCxnSpPr>
+          <p:nvPr/>
+        </p:nvCxnSpPr>
+        <p:spPr>
+          <a:xfrm>
+            <a:off x="6826033" y="459785"/>
+            <a:ext cx="403888" cy="8504"/>
           </a:xfrm>
           <a:prstGeom prst="straightConnector1">
             <a:avLst/>

</xml_diff>

<commit_message>
Se realizaron mejoras al caso 8 y se creo el caso 9 para simplificar el caso 8.
</commit_message>
<xml_diff>
--- a/datos/DiagramaAlgoritmo.pptx
+++ b/datos/DiagramaAlgoritmo.pptx
@@ -286,7 +286,7 @@
           <a:p>
             <a:fld id="{9DA5C79F-2E3E-4F45-BFFD-84CC133900D2}" type="datetimeFigureOut">
               <a:rPr lang="es-PA" smtClean="0"/>
-              <a:t>05/mar.2022</a:t>
+              <a:t>28/mar.2022</a:t>
             </a:fld>
             <a:endParaRPr lang="es-PA"/>
           </a:p>
@@ -486,7 +486,7 @@
           <a:p>
             <a:fld id="{9DA5C79F-2E3E-4F45-BFFD-84CC133900D2}" type="datetimeFigureOut">
               <a:rPr lang="es-PA" smtClean="0"/>
-              <a:t>05/mar.2022</a:t>
+              <a:t>28/mar.2022</a:t>
             </a:fld>
             <a:endParaRPr lang="es-PA"/>
           </a:p>
@@ -696,7 +696,7 @@
           <a:p>
             <a:fld id="{9DA5C79F-2E3E-4F45-BFFD-84CC133900D2}" type="datetimeFigureOut">
               <a:rPr lang="es-PA" smtClean="0"/>
-              <a:t>05/mar.2022</a:t>
+              <a:t>28/mar.2022</a:t>
             </a:fld>
             <a:endParaRPr lang="es-PA"/>
           </a:p>
@@ -896,7 +896,7 @@
           <a:p>
             <a:fld id="{9DA5C79F-2E3E-4F45-BFFD-84CC133900D2}" type="datetimeFigureOut">
               <a:rPr lang="es-PA" smtClean="0"/>
-              <a:t>05/mar.2022</a:t>
+              <a:t>28/mar.2022</a:t>
             </a:fld>
             <a:endParaRPr lang="es-PA"/>
           </a:p>
@@ -1172,7 +1172,7 @@
           <a:p>
             <a:fld id="{9DA5C79F-2E3E-4F45-BFFD-84CC133900D2}" type="datetimeFigureOut">
               <a:rPr lang="es-PA" smtClean="0"/>
-              <a:t>05/mar.2022</a:t>
+              <a:t>28/mar.2022</a:t>
             </a:fld>
             <a:endParaRPr lang="es-PA"/>
           </a:p>
@@ -1440,7 +1440,7 @@
           <a:p>
             <a:fld id="{9DA5C79F-2E3E-4F45-BFFD-84CC133900D2}" type="datetimeFigureOut">
               <a:rPr lang="es-PA" smtClean="0"/>
-              <a:t>05/mar.2022</a:t>
+              <a:t>28/mar.2022</a:t>
             </a:fld>
             <a:endParaRPr lang="es-PA"/>
           </a:p>
@@ -1855,7 +1855,7 @@
           <a:p>
             <a:fld id="{9DA5C79F-2E3E-4F45-BFFD-84CC133900D2}" type="datetimeFigureOut">
               <a:rPr lang="es-PA" smtClean="0"/>
-              <a:t>05/mar.2022</a:t>
+              <a:t>28/mar.2022</a:t>
             </a:fld>
             <a:endParaRPr lang="es-PA"/>
           </a:p>
@@ -1997,7 +1997,7 @@
           <a:p>
             <a:fld id="{9DA5C79F-2E3E-4F45-BFFD-84CC133900D2}" type="datetimeFigureOut">
               <a:rPr lang="es-PA" smtClean="0"/>
-              <a:t>05/mar.2022</a:t>
+              <a:t>28/mar.2022</a:t>
             </a:fld>
             <a:endParaRPr lang="es-PA"/>
           </a:p>
@@ -2110,7 +2110,7 @@
           <a:p>
             <a:fld id="{9DA5C79F-2E3E-4F45-BFFD-84CC133900D2}" type="datetimeFigureOut">
               <a:rPr lang="es-PA" smtClean="0"/>
-              <a:t>05/mar.2022</a:t>
+              <a:t>28/mar.2022</a:t>
             </a:fld>
             <a:endParaRPr lang="es-PA"/>
           </a:p>
@@ -2423,7 +2423,7 @@
           <a:p>
             <a:fld id="{9DA5C79F-2E3E-4F45-BFFD-84CC133900D2}" type="datetimeFigureOut">
               <a:rPr lang="es-PA" smtClean="0"/>
-              <a:t>05/mar.2022</a:t>
+              <a:t>28/mar.2022</a:t>
             </a:fld>
             <a:endParaRPr lang="es-PA"/>
           </a:p>
@@ -2712,7 +2712,7 @@
           <a:p>
             <a:fld id="{9DA5C79F-2E3E-4F45-BFFD-84CC133900D2}" type="datetimeFigureOut">
               <a:rPr lang="es-PA" smtClean="0"/>
-              <a:t>05/mar.2022</a:t>
+              <a:t>28/mar.2022</a:t>
             </a:fld>
             <a:endParaRPr lang="es-PA"/>
           </a:p>
@@ -2955,7 +2955,7 @@
           <a:p>
             <a:fld id="{9DA5C79F-2E3E-4F45-BFFD-84CC133900D2}" type="datetimeFigureOut">
               <a:rPr lang="es-PA" smtClean="0"/>
-              <a:t>05/mar.2022</a:t>
+              <a:t>28/mar.2022</a:t>
             </a:fld>
             <a:endParaRPr lang="es-PA"/>
           </a:p>
@@ -7415,7 +7415,7 @@
         </p:nvSpPr>
         <p:spPr>
           <a:xfrm>
-            <a:off x="1491895" y="4006215"/>
+            <a:off x="1547198" y="2871170"/>
             <a:ext cx="1400175" cy="613410"/>
           </a:xfrm>
           <a:prstGeom prst="flowChartAlternateProcess">
@@ -7529,7 +7529,7 @@
         </p:nvSpPr>
         <p:spPr>
           <a:xfrm>
-            <a:off x="1472845" y="4863465"/>
+            <a:off x="1528148" y="3728420"/>
             <a:ext cx="1400175" cy="613410"/>
           </a:xfrm>
           <a:prstGeom prst="flowChartAlternateProcess">
@@ -7674,7 +7674,7 @@
         </p:nvSpPr>
         <p:spPr>
           <a:xfrm>
-            <a:off x="1472844" y="5720715"/>
+            <a:off x="1528147" y="4585670"/>
             <a:ext cx="1400175" cy="613410"/>
           </a:xfrm>
           <a:prstGeom prst="flowChartAlternateProcess">
@@ -7822,8 +7822,8 @@
         </p:nvCxnSpPr>
         <p:spPr>
           <a:xfrm rot="16200000" flipH="1">
-            <a:off x="-755389" y="2941936"/>
-            <a:ext cx="4179570" cy="276897"/>
+            <a:off x="-160214" y="2346762"/>
+            <a:ext cx="3044525" cy="332200"/>
           </a:xfrm>
           <a:prstGeom prst="bentConnector2">
             <a:avLst/>
@@ -7906,8 +7906,8 @@
         </p:nvCxnSpPr>
         <p:spPr>
           <a:xfrm rot="16200000" flipH="1">
-            <a:off x="-317239" y="2503786"/>
-            <a:ext cx="3322320" cy="295947"/>
+            <a:off x="277936" y="1908612"/>
+            <a:ext cx="2187275" cy="351250"/>
           </a:xfrm>
           <a:prstGeom prst="bentConnector2">
             <a:avLst/>
@@ -7948,8 +7948,8 @@
         </p:nvCxnSpPr>
         <p:spPr>
           <a:xfrm rot="16200000" flipH="1">
-            <a:off x="-1184014" y="3370562"/>
-            <a:ext cx="5036820" cy="276896"/>
+            <a:off x="-588840" y="2775387"/>
+            <a:ext cx="3901775" cy="332199"/>
           </a:xfrm>
           <a:prstGeom prst="bentConnector2">
             <a:avLst/>
@@ -8348,7 +8348,7 @@
         </p:nvSpPr>
         <p:spPr>
           <a:xfrm>
-            <a:off x="3802771" y="1755457"/>
+            <a:off x="3802771" y="1252340"/>
             <a:ext cx="1038225" cy="438150"/>
           </a:xfrm>
           <a:prstGeom prst="flowChartTerminator">
@@ -8407,7 +8407,7 @@
                 <a:ea typeface="+mn-ea"/>
                 <a:cs typeface="+mn-cs"/>
               </a:rPr>
-              <a:t>Caso</a:t>
+              <a:t>Caso8</a:t>
             </a:r>
           </a:p>
         </p:txBody>
@@ -8429,9 +8429,9 @@
           <p:nvPr/>
         </p:nvCxnSpPr>
         <p:spPr>
-          <a:xfrm>
-            <a:off x="3147397" y="1974532"/>
-            <a:ext cx="655374" cy="12700"/>
+          <a:xfrm flipV="1">
+            <a:off x="3147397" y="1471415"/>
+            <a:ext cx="655374" cy="503117"/>
           </a:xfrm>
           <a:prstGeom prst="bentConnector3">
             <a:avLst/>
@@ -8469,7 +8469,7 @@
         </p:nvSpPr>
         <p:spPr>
           <a:xfrm>
-            <a:off x="5244883" y="1642807"/>
+            <a:off x="5244883" y="1139690"/>
             <a:ext cx="1729854" cy="655320"/>
           </a:xfrm>
           <a:prstGeom prst="flowChartPreparation">
@@ -8528,7 +8528,7 @@
                 <a:ea typeface="+mn-ea"/>
                 <a:cs typeface="+mn-cs"/>
               </a:rPr>
-              <a:t>interpolacionDiametroEqv</a:t>
+              <a:t>interpolacionPerdida</a:t>
             </a:r>
             <a:endParaRPr kumimoji="0" lang="es-PA" sz="1200" b="0" i="0" u="none" strike="noStrike" kern="1200" cap="none" spc="0" normalizeH="0" baseline="0" noProof="0" dirty="0">
               <a:ln>
@@ -8565,7 +8565,7 @@
         </p:nvCxnSpPr>
         <p:spPr>
           <a:xfrm flipV="1">
-            <a:off x="4840996" y="1970467"/>
+            <a:off x="4840996" y="1467350"/>
             <a:ext cx="403887" cy="4065"/>
           </a:xfrm>
           <a:prstGeom prst="bentConnector3">
@@ -8592,10 +8592,10 @@
       </p:cxnSp>
       <p:sp>
         <p:nvSpPr>
-          <p:cNvPr id="113" name="Diagrama de flujo: terminador 112">
-            <a:extLst>
-              <a:ext uri="{FF2B5EF4-FFF2-40B4-BE49-F238E27FC236}">
-                <a16:creationId xmlns:a16="http://schemas.microsoft.com/office/drawing/2014/main" id="{5A23D127-9ED7-4E85-A107-BCFF34F98101}"/>
+          <p:cNvPr id="57" name="Diagrama de flujo: proceso 56">
+            <a:extLst>
+              <a:ext uri="{FF2B5EF4-FFF2-40B4-BE49-F238E27FC236}">
+                <a16:creationId xmlns:a16="http://schemas.microsoft.com/office/drawing/2014/main" id="{F71E7FCE-F8EF-4179-90EB-EAA72FB884F1}"/>
               </a:ext>
             </a:extLst>
           </p:cNvPr>
@@ -8604,24 +8604,322 @@
         </p:nvSpPr>
         <p:spPr>
           <a:xfrm>
-            <a:off x="3802771" y="3568065"/>
-            <a:ext cx="1038225" cy="438150"/>
-          </a:xfrm>
-          <a:prstGeom prst="flowChartTerminator">
+            <a:off x="7229921" y="187301"/>
+            <a:ext cx="1152352" cy="561975"/>
+          </a:xfrm>
+          <a:prstGeom prst="flowChartProcess">
+            <a:avLst/>
+          </a:prstGeom>
+        </p:spPr>
+        <p:style>
+          <a:lnRef idx="1">
+            <a:schemeClr val="accent5"/>
+          </a:lnRef>
+          <a:fillRef idx="3">
+            <a:schemeClr val="accent5"/>
+          </a:fillRef>
+          <a:effectRef idx="2">
+            <a:schemeClr val="accent5"/>
+          </a:effectRef>
+          <a:fontRef idx="minor">
+            <a:schemeClr val="lt1"/>
+          </a:fontRef>
+        </p:style>
+        <p:txBody>
+          <a:bodyPr rtlCol="0" anchor="ctr"/>
+          <a:lstStyle/>
+          <a:p>
+            <a:pPr marL="0" marR="0" lvl="0" indent="0" algn="ctr" defTabSz="914400" rtl="0" eaLnBrk="1" fontAlgn="auto" latinLnBrk="0" hangingPunct="1">
+              <a:lnSpc>
+                <a:spcPct val="100000"/>
+              </a:lnSpc>
+              <a:spcBef>
+                <a:spcPts val="0"/>
+              </a:spcBef>
+              <a:spcAft>
+                <a:spcPts val="0"/>
+              </a:spcAft>
+              <a:buClrTx/>
+              <a:buSzTx/>
+              <a:buFontTx/>
+              <a:buNone/>
+              <a:tabLst/>
+              <a:defRPr/>
+            </a:pPr>
+            <a:r>
+              <a:rPr kumimoji="0" lang="es-PA" sz="1400" b="0" i="0" u="none" strike="noStrike" kern="1200" cap="none" spc="0" normalizeH="0" baseline="0" noProof="0" dirty="0" err="1">
+                <a:ln>
+                  <a:noFill/>
+                </a:ln>
+                <a:solidFill>
+                  <a:prstClr val="white"/>
+                </a:solidFill>
+                <a:effectLst/>
+                <a:uLnTx/>
+                <a:uFillTx/>
+                <a:latin typeface="Calibri" panose="020F0502020204030204"/>
+                <a:ea typeface="+mn-ea"/>
+                <a:cs typeface="+mn-cs"/>
+              </a:rPr>
+              <a:t>OperacionesFinales</a:t>
+            </a:r>
+            <a:endParaRPr kumimoji="0" lang="es-PA" sz="1400" b="0" i="0" u="none" strike="noStrike" kern="1200" cap="none" spc="0" normalizeH="0" baseline="0" noProof="0" dirty="0">
+              <a:ln>
+                <a:noFill/>
+              </a:ln>
+              <a:solidFill>
+                <a:prstClr val="white"/>
+              </a:solidFill>
+              <a:effectLst/>
+              <a:uLnTx/>
+              <a:uFillTx/>
+              <a:latin typeface="Calibri" panose="020F0502020204030204"/>
+              <a:ea typeface="+mn-ea"/>
+              <a:cs typeface="+mn-cs"/>
+            </a:endParaRPr>
+          </a:p>
+        </p:txBody>
+      </p:sp>
+      <p:sp>
+        <p:nvSpPr>
+          <p:cNvPr id="67" name="Diagrama de flujo: proceso 66">
+            <a:extLst>
+              <a:ext uri="{FF2B5EF4-FFF2-40B4-BE49-F238E27FC236}">
+                <a16:creationId xmlns:a16="http://schemas.microsoft.com/office/drawing/2014/main" id="{33A85C31-CEC9-43F1-A710-3E919E1ED672}"/>
+              </a:ext>
+            </a:extLst>
+          </p:cNvPr>
+          <p:cNvSpPr/>
+          <p:nvPr/>
+        </p:nvSpPr>
+        <p:spPr>
+          <a:xfrm>
+            <a:off x="7236876" y="2162343"/>
+            <a:ext cx="1152352" cy="561975"/>
+          </a:xfrm>
+          <a:prstGeom prst="flowChartProcess">
+            <a:avLst/>
+          </a:prstGeom>
+        </p:spPr>
+        <p:style>
+          <a:lnRef idx="1">
+            <a:schemeClr val="accent5"/>
+          </a:lnRef>
+          <a:fillRef idx="3">
+            <a:schemeClr val="accent5"/>
+          </a:fillRef>
+          <a:effectRef idx="2">
+            <a:schemeClr val="accent5"/>
+          </a:effectRef>
+          <a:fontRef idx="minor">
+            <a:schemeClr val="lt1"/>
+          </a:fontRef>
+        </p:style>
+        <p:txBody>
+          <a:bodyPr rtlCol="0" anchor="ctr"/>
+          <a:lstStyle/>
+          <a:p>
+            <a:pPr marL="0" marR="0" lvl="0" indent="0" algn="ctr" defTabSz="914400" rtl="0" eaLnBrk="1" fontAlgn="auto" latinLnBrk="0" hangingPunct="1">
+              <a:lnSpc>
+                <a:spcPct val="100000"/>
+              </a:lnSpc>
+              <a:spcBef>
+                <a:spcPts val="0"/>
+              </a:spcBef>
+              <a:spcAft>
+                <a:spcPts val="0"/>
+              </a:spcAft>
+              <a:buClrTx/>
+              <a:buSzTx/>
+              <a:buFontTx/>
+              <a:buNone/>
+              <a:tabLst/>
+              <a:defRPr/>
+            </a:pPr>
+            <a:r>
+              <a:rPr kumimoji="0" lang="es-PA" sz="1400" b="0" i="0" u="none" strike="noStrike" kern="1200" cap="none" spc="0" normalizeH="0" baseline="0" noProof="0" dirty="0" err="1">
+                <a:ln>
+                  <a:noFill/>
+                </a:ln>
+                <a:solidFill>
+                  <a:prstClr val="white"/>
+                </a:solidFill>
+                <a:effectLst/>
+                <a:uLnTx/>
+                <a:uFillTx/>
+                <a:latin typeface="Calibri" panose="020F0502020204030204"/>
+                <a:ea typeface="+mn-ea"/>
+                <a:cs typeface="+mn-cs"/>
+              </a:rPr>
+              <a:t>OperacionesFinales</a:t>
+            </a:r>
+            <a:endParaRPr kumimoji="0" lang="es-PA" sz="1400" b="0" i="0" u="none" strike="noStrike" kern="1200" cap="none" spc="0" normalizeH="0" baseline="0" noProof="0" dirty="0">
+              <a:ln>
+                <a:noFill/>
+              </a:ln>
+              <a:solidFill>
+                <a:prstClr val="white"/>
+              </a:solidFill>
+              <a:effectLst/>
+              <a:uLnTx/>
+              <a:uFillTx/>
+              <a:latin typeface="Calibri" panose="020F0502020204030204"/>
+              <a:ea typeface="+mn-ea"/>
+              <a:cs typeface="+mn-cs"/>
+            </a:endParaRPr>
+          </a:p>
+        </p:txBody>
+      </p:sp>
+      <p:sp>
+        <p:nvSpPr>
+          <p:cNvPr id="68" name="Diagrama de flujo: datos almacenados 67">
+            <a:extLst>
+              <a:ext uri="{FF2B5EF4-FFF2-40B4-BE49-F238E27FC236}">
+                <a16:creationId xmlns:a16="http://schemas.microsoft.com/office/drawing/2014/main" id="{E1ED197A-9BD2-47E1-8FB0-84D2D448D033}"/>
+              </a:ext>
+            </a:extLst>
+          </p:cNvPr>
+          <p:cNvSpPr/>
+          <p:nvPr/>
+        </p:nvSpPr>
+        <p:spPr>
+          <a:xfrm>
+            <a:off x="8818026" y="2227113"/>
+            <a:ext cx="1152352" cy="438150"/>
+          </a:xfrm>
+          <a:prstGeom prst="flowChartOnlineStorage">
             <a:avLst/>
           </a:prstGeom>
         </p:spPr>
         <p:style>
           <a:lnRef idx="2">
-            <a:schemeClr val="accent2">
+            <a:schemeClr val="accent4">
               <a:shade val="50000"/>
             </a:schemeClr>
           </a:lnRef>
           <a:fillRef idx="1">
-            <a:schemeClr val="accent2"/>
+            <a:schemeClr val="accent4"/>
           </a:fillRef>
           <a:effectRef idx="0">
-            <a:schemeClr val="accent2"/>
+            <a:schemeClr val="accent4"/>
+          </a:effectRef>
+          <a:fontRef idx="minor">
+            <a:schemeClr val="lt1"/>
+          </a:fontRef>
+        </p:style>
+        <p:txBody>
+          <a:bodyPr rtlCol="0" anchor="ctr"/>
+          <a:lstStyle/>
+          <a:p>
+            <a:pPr marL="0" marR="0" lvl="0" indent="0" algn="ctr" defTabSz="914400" rtl="0" eaLnBrk="1" fontAlgn="auto" latinLnBrk="0" hangingPunct="1">
+              <a:lnSpc>
+                <a:spcPct val="100000"/>
+              </a:lnSpc>
+              <a:spcBef>
+                <a:spcPts val="0"/>
+              </a:spcBef>
+              <a:spcAft>
+                <a:spcPts val="0"/>
+              </a:spcAft>
+              <a:buClrTx/>
+              <a:buSzTx/>
+              <a:buFontTx/>
+              <a:buNone/>
+              <a:tabLst/>
+              <a:defRPr/>
+            </a:pPr>
+            <a:r>
+              <a:rPr kumimoji="0" lang="es-PA" sz="1200" b="0" i="0" u="none" strike="noStrike" kern="1200" cap="none" spc="0" normalizeH="0" baseline="0" noProof="0" dirty="0">
+                <a:ln>
+                  <a:noFill/>
+                </a:ln>
+                <a:solidFill>
+                  <a:prstClr val="white"/>
+                </a:solidFill>
+                <a:effectLst/>
+                <a:uLnTx/>
+                <a:uFillTx/>
+                <a:latin typeface="Calibri" panose="020F0502020204030204"/>
+                <a:ea typeface="+mn-ea"/>
+                <a:cs typeface="+mn-cs"/>
+              </a:rPr>
+              <a:t>Cálculos</a:t>
+            </a:r>
+          </a:p>
+        </p:txBody>
+      </p:sp>
+      <p:cxnSp>
+        <p:nvCxnSpPr>
+          <p:cNvPr id="70" name="Conector recto de flecha 69">
+            <a:extLst>
+              <a:ext uri="{FF2B5EF4-FFF2-40B4-BE49-F238E27FC236}">
+                <a16:creationId xmlns:a16="http://schemas.microsoft.com/office/drawing/2014/main" id="{3F7D1CA8-5735-48FA-B500-3578C1B2FE31}"/>
+              </a:ext>
+            </a:extLst>
+          </p:cNvPr>
+          <p:cNvCxnSpPr>
+            <a:stCxn id="67" idx="3"/>
+            <a:endCxn id="68" idx="1"/>
+          </p:cNvCxnSpPr>
+          <p:nvPr/>
+        </p:nvCxnSpPr>
+        <p:spPr>
+          <a:xfrm>
+            <a:off x="8389228" y="2443331"/>
+            <a:ext cx="428798" cy="2857"/>
+          </a:xfrm>
+          <a:prstGeom prst="straightConnector1">
+            <a:avLst/>
+          </a:prstGeom>
+          <a:ln>
+            <a:tailEnd type="triangle"/>
+          </a:ln>
+        </p:spPr>
+        <p:style>
+          <a:lnRef idx="1">
+            <a:schemeClr val="accent1"/>
+          </a:lnRef>
+          <a:fillRef idx="0">
+            <a:schemeClr val="accent1"/>
+          </a:fillRef>
+          <a:effectRef idx="0">
+            <a:schemeClr val="accent1"/>
+          </a:effectRef>
+          <a:fontRef idx="minor">
+            <a:schemeClr val="tx1"/>
+          </a:fontRef>
+        </p:style>
+      </p:cxnSp>
+      <p:sp>
+        <p:nvSpPr>
+          <p:cNvPr id="71" name="Diagrama de flujo: proceso 70">
+            <a:extLst>
+              <a:ext uri="{FF2B5EF4-FFF2-40B4-BE49-F238E27FC236}">
+                <a16:creationId xmlns:a16="http://schemas.microsoft.com/office/drawing/2014/main" id="{33D2DE57-FD0A-4CE8-9EDA-BDAC161DA7A0}"/>
+              </a:ext>
+            </a:extLst>
+          </p:cNvPr>
+          <p:cNvSpPr/>
+          <p:nvPr/>
+        </p:nvSpPr>
+        <p:spPr>
+          <a:xfrm>
+            <a:off x="10399176" y="2224872"/>
+            <a:ext cx="1009650" cy="438150"/>
+          </a:xfrm>
+          <a:prstGeom prst="flowChartProcess">
+            <a:avLst/>
+          </a:prstGeom>
+        </p:spPr>
+        <p:style>
+          <a:lnRef idx="1">
+            <a:schemeClr val="accent5"/>
+          </a:lnRef>
+          <a:fillRef idx="3">
+            <a:schemeClr val="accent5"/>
+          </a:fillRef>
+          <a:effectRef idx="2">
+            <a:schemeClr val="accent5"/>
           </a:effectRef>
           <a:fontRef idx="minor">
             <a:schemeClr val="lt1"/>
@@ -8663,36 +8961,33 @@
                 <a:ea typeface="+mn-ea"/>
                 <a:cs typeface="+mn-cs"/>
               </a:rPr>
-              <a:t>Caso</a:t>
+              <a:t>Resultados</a:t>
             </a:r>
           </a:p>
         </p:txBody>
       </p:sp>
       <p:cxnSp>
         <p:nvCxnSpPr>
-          <p:cNvPr id="119" name="Conector: angular 118">
-            <a:extLst>
-              <a:ext uri="{FF2B5EF4-FFF2-40B4-BE49-F238E27FC236}">
-                <a16:creationId xmlns:a16="http://schemas.microsoft.com/office/drawing/2014/main" id="{2868ABEC-8A0E-4570-8B73-AC9744A3B477}"/>
+          <p:cNvPr id="72" name="Conector recto de flecha 71">
+            <a:extLst>
+              <a:ext uri="{FF2B5EF4-FFF2-40B4-BE49-F238E27FC236}">
+                <a16:creationId xmlns:a16="http://schemas.microsoft.com/office/drawing/2014/main" id="{1B03B6F2-9B14-4000-A1D9-35F3DC93AE27}"/>
               </a:ext>
             </a:extLst>
           </p:cNvPr>
           <p:cNvCxnSpPr>
-            <a:cxnSpLocks/>
-            <a:stCxn id="17" idx="3"/>
-            <a:endCxn id="113" idx="1"/>
+            <a:stCxn id="68" idx="3"/>
+            <a:endCxn id="71" idx="1"/>
           </p:cNvCxnSpPr>
           <p:nvPr/>
         </p:nvCxnSpPr>
         <p:spPr>
-          <a:xfrm>
-            <a:off x="3147397" y="1974532"/>
-            <a:ext cx="655374" cy="1812608"/>
-          </a:xfrm>
-          <a:prstGeom prst="bentConnector3">
-            <a:avLst>
-              <a:gd name="adj1" fmla="val 50000"/>
-            </a:avLst>
+          <a:xfrm flipV="1">
+            <a:off x="9778319" y="2443947"/>
+            <a:ext cx="620857" cy="2241"/>
+          </a:xfrm>
+          <a:prstGeom prst="straightConnector1">
+            <a:avLst/>
           </a:prstGeom>
           <a:ln>
             <a:tailEnd type="triangle"/>
@@ -8715,10 +9010,10 @@
       </p:cxnSp>
       <p:sp>
         <p:nvSpPr>
-          <p:cNvPr id="125" name="Diagrama de flujo: preparación 124">
-            <a:extLst>
-              <a:ext uri="{FF2B5EF4-FFF2-40B4-BE49-F238E27FC236}">
-                <a16:creationId xmlns:a16="http://schemas.microsoft.com/office/drawing/2014/main" id="{09049C69-F1DA-4802-BA74-192C46A0D622}"/>
+          <p:cNvPr id="43" name="Diagrama de flujo: preparación 42">
+            <a:extLst>
+              <a:ext uri="{FF2B5EF4-FFF2-40B4-BE49-F238E27FC236}">
+                <a16:creationId xmlns:a16="http://schemas.microsoft.com/office/drawing/2014/main" id="{B5BE8293-1A44-40C0-8C34-9059D15C8AF4}"/>
               </a:ext>
             </a:extLst>
           </p:cNvPr>
@@ -8727,8 +9022,8 @@
         </p:nvSpPr>
         <p:spPr>
           <a:xfrm>
-            <a:off x="5522033" y="3140700"/>
-            <a:ext cx="1729853" cy="576599"/>
+            <a:off x="5244883" y="76880"/>
+            <a:ext cx="1581150" cy="765810"/>
           </a:xfrm>
           <a:prstGeom prst="flowChartPreparation">
             <a:avLst/>
@@ -8754,81 +9049,36 @@
           <a:bodyPr rtlCol="0" anchor="ctr"/>
           <a:lstStyle/>
           <a:p>
-            <a:pPr marL="0" marR="0" lvl="0" indent="0" algn="ctr" defTabSz="914400" rtl="0" eaLnBrk="1" fontAlgn="auto" latinLnBrk="0" hangingPunct="1">
-              <a:lnSpc>
-                <a:spcPct val="100000"/>
-              </a:lnSpc>
-              <a:spcBef>
-                <a:spcPts val="0"/>
-              </a:spcBef>
-              <a:spcAft>
-                <a:spcPts val="0"/>
-              </a:spcAft>
-              <a:buClrTx/>
-              <a:buSzTx/>
-              <a:buFontTx/>
-              <a:buNone/>
-              <a:tabLst/>
-              <a:defRPr/>
-            </a:pPr>
-            <a:r>
-              <a:rPr kumimoji="0" lang="es-PA" sz="1200" b="0" i="0" u="none" strike="noStrike" kern="1200" cap="none" spc="0" normalizeH="0" baseline="0" noProof="0" dirty="0" err="1">
-                <a:ln>
-                  <a:noFill/>
-                </a:ln>
-                <a:solidFill>
-                  <a:prstClr val="white"/>
-                </a:solidFill>
-                <a:effectLst/>
-                <a:uLnTx/>
-                <a:uFillTx/>
-                <a:latin typeface="Calibri" panose="020F0502020204030204"/>
-                <a:ea typeface="+mn-ea"/>
-                <a:cs typeface="+mn-cs"/>
-              </a:rPr>
-              <a:t>interpolacionDiametroEqv</a:t>
-            </a:r>
-            <a:endParaRPr kumimoji="0" lang="es-PA" sz="1200" b="0" i="0" u="none" strike="noStrike" kern="1200" cap="none" spc="0" normalizeH="0" baseline="0" noProof="0" dirty="0">
-              <a:ln>
-                <a:noFill/>
-              </a:ln>
-              <a:solidFill>
-                <a:prstClr val="white"/>
-              </a:solidFill>
-              <a:effectLst/>
-              <a:uLnTx/>
-              <a:uFillTx/>
-              <a:latin typeface="Calibri" panose="020F0502020204030204"/>
-              <a:ea typeface="+mn-ea"/>
-              <a:cs typeface="+mn-cs"/>
-            </a:endParaRPr>
+            <a:pPr algn="ctr"/>
+            <a:r>
+              <a:rPr lang="es-PA" sz="1200" dirty="0"/>
+              <a:t>interpolacionVelocidadMetodo2</a:t>
+            </a:r>
           </a:p>
         </p:txBody>
       </p:sp>
       <p:cxnSp>
         <p:nvCxnSpPr>
-          <p:cNvPr id="127" name="Conector: angular 126">
-            <a:extLst>
-              <a:ext uri="{FF2B5EF4-FFF2-40B4-BE49-F238E27FC236}">
-                <a16:creationId xmlns:a16="http://schemas.microsoft.com/office/drawing/2014/main" id="{58B50E9C-0A94-4FC4-8CC2-C3DB43FDA57B}"/>
+          <p:cNvPr id="5" name="Conector recto de flecha 4">
+            <a:extLst>
+              <a:ext uri="{FF2B5EF4-FFF2-40B4-BE49-F238E27FC236}">
+                <a16:creationId xmlns:a16="http://schemas.microsoft.com/office/drawing/2014/main" id="{AD535E6B-F4DF-4DAF-954D-04A0B4A94789}"/>
               </a:ext>
             </a:extLst>
           </p:cNvPr>
           <p:cNvCxnSpPr>
-            <a:stCxn id="113" idx="3"/>
-            <a:endCxn id="125" idx="1"/>
+            <a:stCxn id="59" idx="3"/>
+            <a:endCxn id="43" idx="1"/>
           </p:cNvCxnSpPr>
           <p:nvPr/>
         </p:nvCxnSpPr>
         <p:spPr>
           <a:xfrm flipV="1">
-            <a:off x="4840996" y="3429000"/>
-            <a:ext cx="681037" cy="358140"/>
-          </a:xfrm>
-          <a:prstGeom prst="bentConnector3">
-            <a:avLst>
-              <a:gd name="adj1" fmla="val 58392"/>
-            </a:avLst>
+            <a:off x="4840996" y="459785"/>
+            <a:ext cx="403887" cy="4699"/>
+          </a:xfrm>
+          <a:prstGeom prst="straightConnector1">
+            <a:avLst/>
           </a:prstGeom>
           <a:ln>
             <a:tailEnd type="triangle"/>
@@ -8849,12 +9099,54 @@
           </a:fontRef>
         </p:style>
       </p:cxnSp>
-      <p:sp>
-        <p:nvSpPr>
-          <p:cNvPr id="128" name="Diagrama de flujo: preparación 127">
-            <a:extLst>
-              <a:ext uri="{FF2B5EF4-FFF2-40B4-BE49-F238E27FC236}">
-                <a16:creationId xmlns:a16="http://schemas.microsoft.com/office/drawing/2014/main" id="{A0812387-809B-42AA-A37E-38F92625C9AE}"/>
+      <p:cxnSp>
+        <p:nvCxnSpPr>
+          <p:cNvPr id="8" name="Conector recto de flecha 7">
+            <a:extLst>
+              <a:ext uri="{FF2B5EF4-FFF2-40B4-BE49-F238E27FC236}">
+                <a16:creationId xmlns:a16="http://schemas.microsoft.com/office/drawing/2014/main" id="{6EAB8525-F1AD-457A-900C-B6E2E350AFDA}"/>
+              </a:ext>
+            </a:extLst>
+          </p:cNvPr>
+          <p:cNvCxnSpPr>
+            <a:stCxn id="43" idx="3"/>
+            <a:endCxn id="57" idx="1"/>
+          </p:cNvCxnSpPr>
+          <p:nvPr/>
+        </p:nvCxnSpPr>
+        <p:spPr>
+          <a:xfrm>
+            <a:off x="6826033" y="459785"/>
+            <a:ext cx="403888" cy="8504"/>
+          </a:xfrm>
+          <a:prstGeom prst="straightConnector1">
+            <a:avLst/>
+          </a:prstGeom>
+          <a:ln>
+            <a:tailEnd type="triangle"/>
+          </a:ln>
+        </p:spPr>
+        <p:style>
+          <a:lnRef idx="1">
+            <a:schemeClr val="accent1"/>
+          </a:lnRef>
+          <a:fillRef idx="0">
+            <a:schemeClr val="accent1"/>
+          </a:fillRef>
+          <a:effectRef idx="0">
+            <a:schemeClr val="accent1"/>
+          </a:effectRef>
+          <a:fontRef idx="minor">
+            <a:schemeClr val="tx1"/>
+          </a:fontRef>
+        </p:style>
+      </p:cxnSp>
+      <p:sp>
+        <p:nvSpPr>
+          <p:cNvPr id="44" name="Diagrama de flujo: preparación 43">
+            <a:extLst>
+              <a:ext uri="{FF2B5EF4-FFF2-40B4-BE49-F238E27FC236}">
+                <a16:creationId xmlns:a16="http://schemas.microsoft.com/office/drawing/2014/main" id="{C17921E5-D31C-43AA-B9D3-DFADBBA6A847}"/>
               </a:ext>
             </a:extLst>
           </p:cNvPr>
@@ -8863,7 +9155,7 @@
         </p:nvSpPr>
         <p:spPr>
           <a:xfrm>
-            <a:off x="5543996" y="4027170"/>
+            <a:off x="5253037" y="2159104"/>
             <a:ext cx="1685925" cy="576599"/>
           </a:xfrm>
           <a:prstGeom prst="flowChartPreparation">
@@ -8941,12 +9233,96 @@
           </a:p>
         </p:txBody>
       </p:sp>
-      <p:sp>
-        <p:nvSpPr>
-          <p:cNvPr id="145" name="Diagrama de flujo: proceso 144">
-            <a:extLst>
-              <a:ext uri="{FF2B5EF4-FFF2-40B4-BE49-F238E27FC236}">
-                <a16:creationId xmlns:a16="http://schemas.microsoft.com/office/drawing/2014/main" id="{E476AA86-CA43-4F8D-941F-97CA6599BEAF}"/>
+      <p:cxnSp>
+        <p:nvCxnSpPr>
+          <p:cNvPr id="15" name="Conector recto de flecha 14">
+            <a:extLst>
+              <a:ext uri="{FF2B5EF4-FFF2-40B4-BE49-F238E27FC236}">
+                <a16:creationId xmlns:a16="http://schemas.microsoft.com/office/drawing/2014/main" id="{5C6558D3-F647-456F-8B10-94AED3D3E4AD}"/>
+              </a:ext>
+            </a:extLst>
+          </p:cNvPr>
+          <p:cNvCxnSpPr>
+            <a:stCxn id="44" idx="3"/>
+            <a:endCxn id="67" idx="1"/>
+          </p:cNvCxnSpPr>
+          <p:nvPr/>
+        </p:nvCxnSpPr>
+        <p:spPr>
+          <a:xfrm flipV="1">
+            <a:off x="6938962" y="2443331"/>
+            <a:ext cx="297914" cy="4073"/>
+          </a:xfrm>
+          <a:prstGeom prst="straightConnector1">
+            <a:avLst/>
+          </a:prstGeom>
+          <a:ln>
+            <a:tailEnd type="triangle"/>
+          </a:ln>
+        </p:spPr>
+        <p:style>
+          <a:lnRef idx="1">
+            <a:schemeClr val="accent1"/>
+          </a:lnRef>
+          <a:fillRef idx="0">
+            <a:schemeClr val="accent1"/>
+          </a:fillRef>
+          <a:effectRef idx="0">
+            <a:schemeClr val="accent1"/>
+          </a:effectRef>
+          <a:fontRef idx="minor">
+            <a:schemeClr val="tx1"/>
+          </a:fontRef>
+        </p:style>
+      </p:cxnSp>
+      <p:cxnSp>
+        <p:nvCxnSpPr>
+          <p:cNvPr id="21" name="Conector recto de flecha 20">
+            <a:extLst>
+              <a:ext uri="{FF2B5EF4-FFF2-40B4-BE49-F238E27FC236}">
+                <a16:creationId xmlns:a16="http://schemas.microsoft.com/office/drawing/2014/main" id="{5B80D5DD-007C-4082-AE0F-B3E95C149740}"/>
+              </a:ext>
+            </a:extLst>
+          </p:cNvPr>
+          <p:cNvCxnSpPr>
+            <a:stCxn id="92" idx="2"/>
+            <a:endCxn id="44" idx="0"/>
+          </p:cNvCxnSpPr>
+          <p:nvPr/>
+        </p:nvCxnSpPr>
+        <p:spPr>
+          <a:xfrm flipH="1">
+            <a:off x="6096000" y="1795010"/>
+            <a:ext cx="13810" cy="364094"/>
+          </a:xfrm>
+          <a:prstGeom prst="straightConnector1">
+            <a:avLst/>
+          </a:prstGeom>
+          <a:ln>
+            <a:tailEnd type="triangle"/>
+          </a:ln>
+        </p:spPr>
+        <p:style>
+          <a:lnRef idx="1">
+            <a:schemeClr val="accent1"/>
+          </a:lnRef>
+          <a:fillRef idx="0">
+            <a:schemeClr val="accent1"/>
+          </a:fillRef>
+          <a:effectRef idx="0">
+            <a:schemeClr val="accent1"/>
+          </a:effectRef>
+          <a:fontRef idx="minor">
+            <a:schemeClr val="tx1"/>
+          </a:fontRef>
+        </p:style>
+      </p:cxnSp>
+      <p:sp>
+        <p:nvSpPr>
+          <p:cNvPr id="64" name="Diagrama de flujo: terminador 63">
+            <a:extLst>
+              <a:ext uri="{FF2B5EF4-FFF2-40B4-BE49-F238E27FC236}">
+                <a16:creationId xmlns:a16="http://schemas.microsoft.com/office/drawing/2014/main" id="{EB0CFC74-198A-4691-B649-924C06FBDC73}"/>
               </a:ext>
             </a:extLst>
           </p:cNvPr>
@@ -8955,7 +9331,220 @@
         </p:nvSpPr>
         <p:spPr>
           <a:xfrm>
-            <a:off x="7641691" y="4041794"/>
+            <a:off x="3802771" y="3298109"/>
+            <a:ext cx="1038225" cy="438150"/>
+          </a:xfrm>
+          <a:prstGeom prst="flowChartTerminator">
+            <a:avLst/>
+          </a:prstGeom>
+        </p:spPr>
+        <p:style>
+          <a:lnRef idx="2">
+            <a:schemeClr val="accent2">
+              <a:shade val="50000"/>
+            </a:schemeClr>
+          </a:lnRef>
+          <a:fillRef idx="1">
+            <a:schemeClr val="accent2"/>
+          </a:fillRef>
+          <a:effectRef idx="0">
+            <a:schemeClr val="accent2"/>
+          </a:effectRef>
+          <a:fontRef idx="minor">
+            <a:schemeClr val="lt1"/>
+          </a:fontRef>
+        </p:style>
+        <p:txBody>
+          <a:bodyPr rtlCol="0" anchor="ctr"/>
+          <a:lstStyle/>
+          <a:p>
+            <a:pPr marL="0" marR="0" lvl="0" indent="0" algn="ctr" defTabSz="914400" rtl="0" eaLnBrk="1" fontAlgn="auto" latinLnBrk="0" hangingPunct="1">
+              <a:lnSpc>
+                <a:spcPct val="100000"/>
+              </a:lnSpc>
+              <a:spcBef>
+                <a:spcPts val="0"/>
+              </a:spcBef>
+              <a:spcAft>
+                <a:spcPts val="0"/>
+              </a:spcAft>
+              <a:buClrTx/>
+              <a:buSzTx/>
+              <a:buFontTx/>
+              <a:buNone/>
+              <a:tabLst/>
+              <a:defRPr/>
+            </a:pPr>
+            <a:r>
+              <a:rPr kumimoji="0" lang="es-PA" sz="1400" b="0" i="0" u="none" strike="noStrike" kern="1200" cap="none" spc="0" normalizeH="0" baseline="0" noProof="0" dirty="0">
+                <a:ln>
+                  <a:noFill/>
+                </a:ln>
+                <a:solidFill>
+                  <a:prstClr val="white"/>
+                </a:solidFill>
+                <a:effectLst/>
+                <a:uLnTx/>
+                <a:uFillTx/>
+                <a:latin typeface="Calibri" panose="020F0502020204030204"/>
+                <a:ea typeface="+mn-ea"/>
+                <a:cs typeface="+mn-cs"/>
+              </a:rPr>
+              <a:t>Caso9</a:t>
+            </a:r>
+          </a:p>
+        </p:txBody>
+      </p:sp>
+      <p:sp>
+        <p:nvSpPr>
+          <p:cNvPr id="65" name="Diagrama de flujo: preparación 64">
+            <a:extLst>
+              <a:ext uri="{FF2B5EF4-FFF2-40B4-BE49-F238E27FC236}">
+                <a16:creationId xmlns:a16="http://schemas.microsoft.com/office/drawing/2014/main" id="{430602B2-048C-4CCB-A9CA-B8A3CB0348EA}"/>
+              </a:ext>
+            </a:extLst>
+          </p:cNvPr>
+          <p:cNvSpPr/>
+          <p:nvPr/>
+        </p:nvSpPr>
+        <p:spPr>
+          <a:xfrm>
+            <a:off x="5244883" y="3185459"/>
+            <a:ext cx="1729854" cy="655320"/>
+          </a:xfrm>
+          <a:prstGeom prst="flowChartPreparation">
+            <a:avLst/>
+          </a:prstGeom>
+        </p:spPr>
+        <p:style>
+          <a:lnRef idx="2">
+            <a:schemeClr val="accent6">
+              <a:shade val="50000"/>
+            </a:schemeClr>
+          </a:lnRef>
+          <a:fillRef idx="1">
+            <a:schemeClr val="accent6"/>
+          </a:fillRef>
+          <a:effectRef idx="0">
+            <a:schemeClr val="accent6"/>
+          </a:effectRef>
+          <a:fontRef idx="minor">
+            <a:schemeClr val="lt1"/>
+          </a:fontRef>
+        </p:style>
+        <p:txBody>
+          <a:bodyPr rtlCol="0" anchor="ctr"/>
+          <a:lstStyle/>
+          <a:p>
+            <a:pPr marL="0" marR="0" lvl="0" indent="0" algn="ctr" defTabSz="914400" rtl="0" eaLnBrk="1" fontAlgn="auto" latinLnBrk="0" hangingPunct="1">
+              <a:lnSpc>
+                <a:spcPct val="100000"/>
+              </a:lnSpc>
+              <a:spcBef>
+                <a:spcPts val="0"/>
+              </a:spcBef>
+              <a:spcAft>
+                <a:spcPts val="0"/>
+              </a:spcAft>
+              <a:buClrTx/>
+              <a:buSzTx/>
+              <a:buFontTx/>
+              <a:buNone/>
+              <a:tabLst/>
+              <a:defRPr/>
+            </a:pPr>
+            <a:r>
+              <a:rPr kumimoji="0" lang="es-PA" sz="1200" b="0" i="0" u="none" strike="noStrike" kern="1200" cap="none" spc="0" normalizeH="0" baseline="0" noProof="0" dirty="0" err="1">
+                <a:ln>
+                  <a:noFill/>
+                </a:ln>
+                <a:solidFill>
+                  <a:prstClr val="white"/>
+                </a:solidFill>
+                <a:effectLst/>
+                <a:uLnTx/>
+                <a:uFillTx/>
+                <a:latin typeface="Calibri" panose="020F0502020204030204"/>
+                <a:ea typeface="+mn-ea"/>
+                <a:cs typeface="+mn-cs"/>
+              </a:rPr>
+              <a:t>interpolacionPerdida</a:t>
+            </a:r>
+            <a:endParaRPr kumimoji="0" lang="es-PA" sz="1200" b="0" i="0" u="none" strike="noStrike" kern="1200" cap="none" spc="0" normalizeH="0" baseline="0" noProof="0" dirty="0">
+              <a:ln>
+                <a:noFill/>
+              </a:ln>
+              <a:solidFill>
+                <a:prstClr val="white"/>
+              </a:solidFill>
+              <a:effectLst/>
+              <a:uLnTx/>
+              <a:uFillTx/>
+              <a:latin typeface="Calibri" panose="020F0502020204030204"/>
+              <a:ea typeface="+mn-ea"/>
+              <a:cs typeface="+mn-cs"/>
+            </a:endParaRPr>
+          </a:p>
+        </p:txBody>
+      </p:sp>
+      <p:cxnSp>
+        <p:nvCxnSpPr>
+          <p:cNvPr id="66" name="Conector: angular 65">
+            <a:extLst>
+              <a:ext uri="{FF2B5EF4-FFF2-40B4-BE49-F238E27FC236}">
+                <a16:creationId xmlns:a16="http://schemas.microsoft.com/office/drawing/2014/main" id="{30D06586-01E1-4CF8-B157-04F698E9142D}"/>
+              </a:ext>
+            </a:extLst>
+          </p:cNvPr>
+          <p:cNvCxnSpPr>
+            <a:cxnSpLocks/>
+            <a:stCxn id="64" idx="3"/>
+            <a:endCxn id="65" idx="1"/>
+          </p:cNvCxnSpPr>
+          <p:nvPr/>
+        </p:nvCxnSpPr>
+        <p:spPr>
+          <a:xfrm flipV="1">
+            <a:off x="4840996" y="3513119"/>
+            <a:ext cx="403887" cy="4065"/>
+          </a:xfrm>
+          <a:prstGeom prst="bentConnector3">
+            <a:avLst/>
+          </a:prstGeom>
+          <a:ln>
+            <a:tailEnd type="triangle"/>
+          </a:ln>
+        </p:spPr>
+        <p:style>
+          <a:lnRef idx="1">
+            <a:schemeClr val="accent1"/>
+          </a:lnRef>
+          <a:fillRef idx="0">
+            <a:schemeClr val="accent1"/>
+          </a:fillRef>
+          <a:effectRef idx="0">
+            <a:schemeClr val="accent1"/>
+          </a:effectRef>
+          <a:fontRef idx="minor">
+            <a:schemeClr val="tx1"/>
+          </a:fontRef>
+        </p:style>
+      </p:cxnSp>
+      <p:sp>
+        <p:nvSpPr>
+          <p:cNvPr id="69" name="Diagrama de flujo: proceso 68">
+            <a:extLst>
+              <a:ext uri="{FF2B5EF4-FFF2-40B4-BE49-F238E27FC236}">
+                <a16:creationId xmlns:a16="http://schemas.microsoft.com/office/drawing/2014/main" id="{0881FDDB-9645-4A98-A594-E77B5F44E714}"/>
+              </a:ext>
+            </a:extLst>
+          </p:cNvPr>
+          <p:cNvSpPr/>
+          <p:nvPr/>
+        </p:nvSpPr>
+        <p:spPr>
+          <a:xfrm>
+            <a:off x="7236876" y="4208112"/>
             <a:ext cx="1152352" cy="561975"/>
           </a:xfrm>
           <a:prstGeom prst="flowChartProcess">
@@ -9033,10 +9622,10 @@
       </p:sp>
       <p:sp>
         <p:nvSpPr>
-          <p:cNvPr id="146" name="Diagrama de flujo: datos almacenados 145">
-            <a:extLst>
-              <a:ext uri="{FF2B5EF4-FFF2-40B4-BE49-F238E27FC236}">
-                <a16:creationId xmlns:a16="http://schemas.microsoft.com/office/drawing/2014/main" id="{C713034C-2BB1-4756-9DD2-93C3C258FAA7}"/>
+          <p:cNvPr id="73" name="Diagrama de flujo: datos almacenados 72">
+            <a:extLst>
+              <a:ext uri="{FF2B5EF4-FFF2-40B4-BE49-F238E27FC236}">
+                <a16:creationId xmlns:a16="http://schemas.microsoft.com/office/drawing/2014/main" id="{6399DFA8-ACE9-4E28-9689-20D4A5D984D6}"/>
               </a:ext>
             </a:extLst>
           </p:cNvPr>
@@ -9045,7 +9634,7 @@
         </p:nvSpPr>
         <p:spPr>
           <a:xfrm>
-            <a:off x="9222841" y="4106564"/>
+            <a:off x="8818026" y="4272882"/>
             <a:ext cx="1152352" cy="438150"/>
           </a:xfrm>
           <a:prstGeom prst="flowChartOnlineStorage">
@@ -9111,22 +9700,22 @@
       </p:sp>
       <p:cxnSp>
         <p:nvCxnSpPr>
-          <p:cNvPr id="147" name="Conector recto de flecha 146">
-            <a:extLst>
-              <a:ext uri="{FF2B5EF4-FFF2-40B4-BE49-F238E27FC236}">
-                <a16:creationId xmlns:a16="http://schemas.microsoft.com/office/drawing/2014/main" id="{7EBB7F2D-0048-4847-8338-335EA851A82A}"/>
+          <p:cNvPr id="75" name="Conector recto de flecha 74">
+            <a:extLst>
+              <a:ext uri="{FF2B5EF4-FFF2-40B4-BE49-F238E27FC236}">
+                <a16:creationId xmlns:a16="http://schemas.microsoft.com/office/drawing/2014/main" id="{DF05590F-AC75-48AD-8831-72A115A2E0F7}"/>
               </a:ext>
             </a:extLst>
           </p:cNvPr>
           <p:cNvCxnSpPr>
-            <a:stCxn id="145" idx="3"/>
-            <a:endCxn id="146" idx="1"/>
+            <a:stCxn id="69" idx="3"/>
+            <a:endCxn id="73" idx="1"/>
           </p:cNvCxnSpPr>
           <p:nvPr/>
         </p:nvCxnSpPr>
         <p:spPr>
           <a:xfrm>
-            <a:off x="8794043" y="4322782"/>
+            <a:off x="8389228" y="4489100"/>
             <a:ext cx="428798" cy="2857"/>
           </a:xfrm>
           <a:prstGeom prst="straightConnector1">
@@ -9153,10 +9742,10 @@
       </p:cxnSp>
       <p:sp>
         <p:nvSpPr>
-          <p:cNvPr id="148" name="Diagrama de flujo: proceso 147">
-            <a:extLst>
-              <a:ext uri="{FF2B5EF4-FFF2-40B4-BE49-F238E27FC236}">
-                <a16:creationId xmlns:a16="http://schemas.microsoft.com/office/drawing/2014/main" id="{3A39CCDE-BEAE-4BBC-B99C-AC2CB9807375}"/>
+          <p:cNvPr id="76" name="Diagrama de flujo: proceso 75">
+            <a:extLst>
+              <a:ext uri="{FF2B5EF4-FFF2-40B4-BE49-F238E27FC236}">
+                <a16:creationId xmlns:a16="http://schemas.microsoft.com/office/drawing/2014/main" id="{FFB97ABF-6F38-4047-8F93-64817BD2008F}"/>
               </a:ext>
             </a:extLst>
           </p:cNvPr>
@@ -9165,7 +9754,7 @@
         </p:nvSpPr>
         <p:spPr>
           <a:xfrm>
-            <a:off x="10803991" y="4104323"/>
+            <a:off x="10399176" y="4270641"/>
             <a:ext cx="1009650" cy="438150"/>
           </a:xfrm>
           <a:prstGeom prst="flowChartProcess">
@@ -9229,22 +9818,22 @@
       </p:sp>
       <p:cxnSp>
         <p:nvCxnSpPr>
-          <p:cNvPr id="149" name="Conector recto de flecha 148">
-            <a:extLst>
-              <a:ext uri="{FF2B5EF4-FFF2-40B4-BE49-F238E27FC236}">
-                <a16:creationId xmlns:a16="http://schemas.microsoft.com/office/drawing/2014/main" id="{2A3F77D1-1FE3-41DB-81DD-7D577F7CE31F}"/>
+          <p:cNvPr id="77" name="Conector recto de flecha 76">
+            <a:extLst>
+              <a:ext uri="{FF2B5EF4-FFF2-40B4-BE49-F238E27FC236}">
+                <a16:creationId xmlns:a16="http://schemas.microsoft.com/office/drawing/2014/main" id="{194FA317-B5A9-4373-B4EC-FB61DCD1F9C1}"/>
               </a:ext>
             </a:extLst>
           </p:cNvPr>
           <p:cNvCxnSpPr>
-            <a:stCxn id="146" idx="3"/>
-            <a:endCxn id="148" idx="1"/>
+            <a:stCxn id="73" idx="3"/>
+            <a:endCxn id="76" idx="1"/>
           </p:cNvCxnSpPr>
           <p:nvPr/>
         </p:nvCxnSpPr>
         <p:spPr>
           <a:xfrm flipV="1">
-            <a:off x="10183134" y="4323398"/>
+            <a:off x="9778319" y="4489716"/>
             <a:ext cx="620857" cy="2241"/>
           </a:xfrm>
           <a:prstGeom prst="straightConnector1">
@@ -9269,78 +9858,38 @@
           </a:fontRef>
         </p:style>
       </p:cxnSp>
-      <p:cxnSp>
-        <p:nvCxnSpPr>
-          <p:cNvPr id="151" name="Conector recto de flecha 150">
-            <a:extLst>
-              <a:ext uri="{FF2B5EF4-FFF2-40B4-BE49-F238E27FC236}">
-                <a16:creationId xmlns:a16="http://schemas.microsoft.com/office/drawing/2014/main" id="{4024E0E0-1E32-4BDE-90B2-3BF2C98CD40B}"/>
-              </a:ext>
-            </a:extLst>
-          </p:cNvPr>
-          <p:cNvCxnSpPr>
-            <a:stCxn id="128" idx="3"/>
-            <a:endCxn id="145" idx="1"/>
-          </p:cNvCxnSpPr>
-          <p:nvPr/>
-        </p:nvCxnSpPr>
+      <p:sp>
+        <p:nvSpPr>
+          <p:cNvPr id="78" name="Diagrama de flujo: preparación 77">
+            <a:extLst>
+              <a:ext uri="{FF2B5EF4-FFF2-40B4-BE49-F238E27FC236}">
+                <a16:creationId xmlns:a16="http://schemas.microsoft.com/office/drawing/2014/main" id="{5D17B319-48D0-4A02-B7DB-326D851A9A09}"/>
+              </a:ext>
+            </a:extLst>
+          </p:cNvPr>
+          <p:cNvSpPr/>
+          <p:nvPr/>
+        </p:nvSpPr>
         <p:spPr>
           <a:xfrm>
-            <a:off x="7229921" y="4315470"/>
-            <a:ext cx="411770" cy="7312"/>
-          </a:xfrm>
-          <a:prstGeom prst="straightConnector1">
-            <a:avLst/>
-          </a:prstGeom>
-          <a:ln>
-            <a:tailEnd type="triangle"/>
-          </a:ln>
-        </p:spPr>
-        <p:style>
-          <a:lnRef idx="1">
-            <a:schemeClr val="accent1"/>
-          </a:lnRef>
-          <a:fillRef idx="0">
-            <a:schemeClr val="accent1"/>
+            <a:off x="5253037" y="4204873"/>
+            <a:ext cx="1685925" cy="576599"/>
+          </a:xfrm>
+          <a:prstGeom prst="flowChartPreparation">
+            <a:avLst/>
+          </a:prstGeom>
+        </p:spPr>
+        <p:style>
+          <a:lnRef idx="2">
+            <a:schemeClr val="accent6">
+              <a:shade val="50000"/>
+            </a:schemeClr>
+          </a:lnRef>
+          <a:fillRef idx="1">
+            <a:schemeClr val="accent6"/>
           </a:fillRef>
           <a:effectRef idx="0">
-            <a:schemeClr val="accent1"/>
-          </a:effectRef>
-          <a:fontRef idx="minor">
-            <a:schemeClr val="tx1"/>
-          </a:fontRef>
-        </p:style>
-      </p:cxnSp>
-      <p:sp>
-        <p:nvSpPr>
-          <p:cNvPr id="57" name="Diagrama de flujo: proceso 56">
-            <a:extLst>
-              <a:ext uri="{FF2B5EF4-FFF2-40B4-BE49-F238E27FC236}">
-                <a16:creationId xmlns:a16="http://schemas.microsoft.com/office/drawing/2014/main" id="{F71E7FCE-F8EF-4179-90EB-EAA72FB884F1}"/>
-              </a:ext>
-            </a:extLst>
-          </p:cNvPr>
-          <p:cNvSpPr/>
-          <p:nvPr/>
-        </p:nvSpPr>
-        <p:spPr>
-          <a:xfrm>
-            <a:off x="7229921" y="187301"/>
-            <a:ext cx="1152352" cy="561975"/>
-          </a:xfrm>
-          <a:prstGeom prst="flowChartProcess">
-            <a:avLst/>
-          </a:prstGeom>
-        </p:spPr>
-        <p:style>
-          <a:lnRef idx="1">
-            <a:schemeClr val="accent5"/>
-          </a:lnRef>
-          <a:fillRef idx="3">
-            <a:schemeClr val="accent5"/>
-          </a:fillRef>
-          <a:effectRef idx="2">
-            <a:schemeClr val="accent5"/>
+            <a:schemeClr val="accent6"/>
           </a:effectRef>
           <a:fontRef idx="minor">
             <a:schemeClr val="lt1"/>
@@ -9368,7 +9917,7 @@
               <a:defRPr/>
             </a:pPr>
             <a:r>
-              <a:rPr kumimoji="0" lang="es-PA" sz="1400" b="0" i="0" u="none" strike="noStrike" kern="1200" cap="none" spc="0" normalizeH="0" baseline="0" noProof="0" dirty="0" err="1">
+              <a:rPr kumimoji="0" lang="es-PA" sz="1200" b="0" i="0" u="none" strike="noStrike" kern="1200" cap="none" spc="0" normalizeH="0" baseline="0" noProof="0" dirty="0" err="1">
                 <a:ln>
                   <a:noFill/>
                 </a:ln>
@@ -9382,9 +9931,9 @@
                 <a:ea typeface="+mn-ea"/>
                 <a:cs typeface="+mn-cs"/>
               </a:rPr>
-              <a:t>OperacionesFinales</a:t>
-            </a:r>
-            <a:endParaRPr kumimoji="0" lang="es-PA" sz="1400" b="0" i="0" u="none" strike="noStrike" kern="1200" cap="none" spc="0" normalizeH="0" baseline="0" noProof="0" dirty="0">
+              <a:t>interpolacionVelocidad</a:t>
+            </a:r>
+            <a:endParaRPr kumimoji="0" lang="es-PA" sz="1200" b="0" i="0" u="none" strike="noStrike" kern="1200" cap="none" spc="0" normalizeH="0" baseline="0" noProof="0" dirty="0">
               <a:ln>
                 <a:noFill/>
               </a:ln>
@@ -9401,193 +9950,25 @@
           </a:p>
         </p:txBody>
       </p:sp>
-      <p:sp>
-        <p:nvSpPr>
-          <p:cNvPr id="67" name="Diagrama de flujo: proceso 66">
-            <a:extLst>
-              <a:ext uri="{FF2B5EF4-FFF2-40B4-BE49-F238E27FC236}">
-                <a16:creationId xmlns:a16="http://schemas.microsoft.com/office/drawing/2014/main" id="{33A85C31-CEC9-43F1-A710-3E919E1ED672}"/>
-              </a:ext>
-            </a:extLst>
-          </p:cNvPr>
-          <p:cNvSpPr/>
-          <p:nvPr/>
-        </p:nvSpPr>
-        <p:spPr>
-          <a:xfrm>
-            <a:off x="7364541" y="1688024"/>
-            <a:ext cx="1152352" cy="561975"/>
-          </a:xfrm>
-          <a:prstGeom prst="flowChartProcess">
-            <a:avLst/>
-          </a:prstGeom>
-        </p:spPr>
-        <p:style>
-          <a:lnRef idx="1">
-            <a:schemeClr val="accent5"/>
-          </a:lnRef>
-          <a:fillRef idx="3">
-            <a:schemeClr val="accent5"/>
-          </a:fillRef>
-          <a:effectRef idx="2">
-            <a:schemeClr val="accent5"/>
-          </a:effectRef>
-          <a:fontRef idx="minor">
-            <a:schemeClr val="lt1"/>
-          </a:fontRef>
-        </p:style>
-        <p:txBody>
-          <a:bodyPr rtlCol="0" anchor="ctr"/>
-          <a:lstStyle/>
-          <a:p>
-            <a:pPr marL="0" marR="0" lvl="0" indent="0" algn="ctr" defTabSz="914400" rtl="0" eaLnBrk="1" fontAlgn="auto" latinLnBrk="0" hangingPunct="1">
-              <a:lnSpc>
-                <a:spcPct val="100000"/>
-              </a:lnSpc>
-              <a:spcBef>
-                <a:spcPts val="0"/>
-              </a:spcBef>
-              <a:spcAft>
-                <a:spcPts val="0"/>
-              </a:spcAft>
-              <a:buClrTx/>
-              <a:buSzTx/>
-              <a:buFontTx/>
-              <a:buNone/>
-              <a:tabLst/>
-              <a:defRPr/>
-            </a:pPr>
-            <a:r>
-              <a:rPr kumimoji="0" lang="es-PA" sz="1400" b="0" i="0" u="none" strike="noStrike" kern="1200" cap="none" spc="0" normalizeH="0" baseline="0" noProof="0" dirty="0" err="1">
-                <a:ln>
-                  <a:noFill/>
-                </a:ln>
-                <a:solidFill>
-                  <a:prstClr val="white"/>
-                </a:solidFill>
-                <a:effectLst/>
-                <a:uLnTx/>
-                <a:uFillTx/>
-                <a:latin typeface="Calibri" panose="020F0502020204030204"/>
-                <a:ea typeface="+mn-ea"/>
-                <a:cs typeface="+mn-cs"/>
-              </a:rPr>
-              <a:t>OperacionesFinales</a:t>
-            </a:r>
-            <a:endParaRPr kumimoji="0" lang="es-PA" sz="1400" b="0" i="0" u="none" strike="noStrike" kern="1200" cap="none" spc="0" normalizeH="0" baseline="0" noProof="0" dirty="0">
-              <a:ln>
-                <a:noFill/>
-              </a:ln>
-              <a:solidFill>
-                <a:prstClr val="white"/>
-              </a:solidFill>
-              <a:effectLst/>
-              <a:uLnTx/>
-              <a:uFillTx/>
-              <a:latin typeface="Calibri" panose="020F0502020204030204"/>
-              <a:ea typeface="+mn-ea"/>
-              <a:cs typeface="+mn-cs"/>
-            </a:endParaRPr>
-          </a:p>
-        </p:txBody>
-      </p:sp>
-      <p:sp>
-        <p:nvSpPr>
-          <p:cNvPr id="68" name="Diagrama de flujo: datos almacenados 67">
-            <a:extLst>
-              <a:ext uri="{FF2B5EF4-FFF2-40B4-BE49-F238E27FC236}">
-                <a16:creationId xmlns:a16="http://schemas.microsoft.com/office/drawing/2014/main" id="{E1ED197A-9BD2-47E1-8FB0-84D2D448D033}"/>
-              </a:ext>
-            </a:extLst>
-          </p:cNvPr>
-          <p:cNvSpPr/>
-          <p:nvPr/>
-        </p:nvSpPr>
-        <p:spPr>
-          <a:xfrm>
-            <a:off x="8945691" y="1752794"/>
-            <a:ext cx="1152352" cy="438150"/>
-          </a:xfrm>
-          <a:prstGeom prst="flowChartOnlineStorage">
-            <a:avLst/>
-          </a:prstGeom>
-        </p:spPr>
-        <p:style>
-          <a:lnRef idx="2">
-            <a:schemeClr val="accent4">
-              <a:shade val="50000"/>
-            </a:schemeClr>
-          </a:lnRef>
-          <a:fillRef idx="1">
-            <a:schemeClr val="accent4"/>
-          </a:fillRef>
-          <a:effectRef idx="0">
-            <a:schemeClr val="accent4"/>
-          </a:effectRef>
-          <a:fontRef idx="minor">
-            <a:schemeClr val="lt1"/>
-          </a:fontRef>
-        </p:style>
-        <p:txBody>
-          <a:bodyPr rtlCol="0" anchor="ctr"/>
-          <a:lstStyle/>
-          <a:p>
-            <a:pPr marL="0" marR="0" lvl="0" indent="0" algn="ctr" defTabSz="914400" rtl="0" eaLnBrk="1" fontAlgn="auto" latinLnBrk="0" hangingPunct="1">
-              <a:lnSpc>
-                <a:spcPct val="100000"/>
-              </a:lnSpc>
-              <a:spcBef>
-                <a:spcPts val="0"/>
-              </a:spcBef>
-              <a:spcAft>
-                <a:spcPts val="0"/>
-              </a:spcAft>
-              <a:buClrTx/>
-              <a:buSzTx/>
-              <a:buFontTx/>
-              <a:buNone/>
-              <a:tabLst/>
-              <a:defRPr/>
-            </a:pPr>
-            <a:r>
-              <a:rPr kumimoji="0" lang="es-PA" sz="1200" b="0" i="0" u="none" strike="noStrike" kern="1200" cap="none" spc="0" normalizeH="0" baseline="0" noProof="0" dirty="0">
-                <a:ln>
-                  <a:noFill/>
-                </a:ln>
-                <a:solidFill>
-                  <a:prstClr val="white"/>
-                </a:solidFill>
-                <a:effectLst/>
-                <a:uLnTx/>
-                <a:uFillTx/>
-                <a:latin typeface="Calibri" panose="020F0502020204030204"/>
-                <a:ea typeface="+mn-ea"/>
-                <a:cs typeface="+mn-cs"/>
-              </a:rPr>
-              <a:t>Cálculos</a:t>
-            </a:r>
-          </a:p>
-        </p:txBody>
-      </p:sp>
       <p:cxnSp>
         <p:nvCxnSpPr>
-          <p:cNvPr id="70" name="Conector recto de flecha 69">
-            <a:extLst>
-              <a:ext uri="{FF2B5EF4-FFF2-40B4-BE49-F238E27FC236}">
-                <a16:creationId xmlns:a16="http://schemas.microsoft.com/office/drawing/2014/main" id="{3F7D1CA8-5735-48FA-B500-3578C1B2FE31}"/>
+          <p:cNvPr id="79" name="Conector recto de flecha 78">
+            <a:extLst>
+              <a:ext uri="{FF2B5EF4-FFF2-40B4-BE49-F238E27FC236}">
+                <a16:creationId xmlns:a16="http://schemas.microsoft.com/office/drawing/2014/main" id="{05100549-F1FB-4694-BC67-359911A450E0}"/>
               </a:ext>
             </a:extLst>
           </p:cNvPr>
           <p:cNvCxnSpPr>
-            <a:stCxn id="67" idx="3"/>
-            <a:endCxn id="68" idx="1"/>
+            <a:stCxn id="78" idx="3"/>
+            <a:endCxn id="69" idx="1"/>
           </p:cNvCxnSpPr>
           <p:nvPr/>
         </p:nvCxnSpPr>
         <p:spPr>
-          <a:xfrm>
-            <a:off x="8516893" y="1969012"/>
-            <a:ext cx="428798" cy="2857"/>
+          <a:xfrm flipV="1">
+            <a:off x="6938962" y="4489100"/>
+            <a:ext cx="297914" cy="4073"/>
           </a:xfrm>
           <a:prstGeom prst="straightConnector1">
             <a:avLst/>
@@ -9611,101 +9992,25 @@
           </a:fontRef>
         </p:style>
       </p:cxnSp>
-      <p:sp>
-        <p:nvSpPr>
-          <p:cNvPr id="71" name="Diagrama de flujo: proceso 70">
-            <a:extLst>
-              <a:ext uri="{FF2B5EF4-FFF2-40B4-BE49-F238E27FC236}">
-                <a16:creationId xmlns:a16="http://schemas.microsoft.com/office/drawing/2014/main" id="{33D2DE57-FD0A-4CE8-9EDA-BDAC161DA7A0}"/>
-              </a:ext>
-            </a:extLst>
-          </p:cNvPr>
-          <p:cNvSpPr/>
-          <p:nvPr/>
-        </p:nvSpPr>
-        <p:spPr>
-          <a:xfrm>
-            <a:off x="10526841" y="1750553"/>
-            <a:ext cx="1009650" cy="438150"/>
-          </a:xfrm>
-          <a:prstGeom prst="flowChartProcess">
-            <a:avLst/>
-          </a:prstGeom>
-        </p:spPr>
-        <p:style>
-          <a:lnRef idx="1">
-            <a:schemeClr val="accent5"/>
-          </a:lnRef>
-          <a:fillRef idx="3">
-            <a:schemeClr val="accent5"/>
-          </a:fillRef>
-          <a:effectRef idx="2">
-            <a:schemeClr val="accent5"/>
-          </a:effectRef>
-          <a:fontRef idx="minor">
-            <a:schemeClr val="lt1"/>
-          </a:fontRef>
-        </p:style>
-        <p:txBody>
-          <a:bodyPr rtlCol="0" anchor="ctr"/>
-          <a:lstStyle/>
-          <a:p>
-            <a:pPr marL="0" marR="0" lvl="0" indent="0" algn="ctr" defTabSz="914400" rtl="0" eaLnBrk="1" fontAlgn="auto" latinLnBrk="0" hangingPunct="1">
-              <a:lnSpc>
-                <a:spcPct val="100000"/>
-              </a:lnSpc>
-              <a:spcBef>
-                <a:spcPts val="0"/>
-              </a:spcBef>
-              <a:spcAft>
-                <a:spcPts val="0"/>
-              </a:spcAft>
-              <a:buClrTx/>
-              <a:buSzTx/>
-              <a:buFontTx/>
-              <a:buNone/>
-              <a:tabLst/>
-              <a:defRPr/>
-            </a:pPr>
-            <a:r>
-              <a:rPr kumimoji="0" lang="es-PA" sz="1400" b="0" i="0" u="none" strike="noStrike" kern="1200" cap="none" spc="0" normalizeH="0" baseline="0" noProof="0" dirty="0">
-                <a:ln>
-                  <a:noFill/>
-                </a:ln>
-                <a:solidFill>
-                  <a:prstClr val="white"/>
-                </a:solidFill>
-                <a:effectLst/>
-                <a:uLnTx/>
-                <a:uFillTx/>
-                <a:latin typeface="Calibri" panose="020F0502020204030204"/>
-                <a:ea typeface="+mn-ea"/>
-                <a:cs typeface="+mn-cs"/>
-              </a:rPr>
-              <a:t>Resultados</a:t>
-            </a:r>
-          </a:p>
-        </p:txBody>
-      </p:sp>
       <p:cxnSp>
         <p:nvCxnSpPr>
-          <p:cNvPr id="72" name="Conector recto de flecha 71">
-            <a:extLst>
-              <a:ext uri="{FF2B5EF4-FFF2-40B4-BE49-F238E27FC236}">
-                <a16:creationId xmlns:a16="http://schemas.microsoft.com/office/drawing/2014/main" id="{1B03B6F2-9B14-4000-A1D9-35F3DC93AE27}"/>
+          <p:cNvPr id="80" name="Conector recto de flecha 79">
+            <a:extLst>
+              <a:ext uri="{FF2B5EF4-FFF2-40B4-BE49-F238E27FC236}">
+                <a16:creationId xmlns:a16="http://schemas.microsoft.com/office/drawing/2014/main" id="{43FF16F7-9DF1-4F94-A7CB-B3692FAEEC12}"/>
               </a:ext>
             </a:extLst>
           </p:cNvPr>
           <p:cNvCxnSpPr>
-            <a:stCxn id="68" idx="3"/>
-            <a:endCxn id="71" idx="1"/>
+            <a:stCxn id="65" idx="2"/>
+            <a:endCxn id="78" idx="0"/>
           </p:cNvCxnSpPr>
           <p:nvPr/>
         </p:nvCxnSpPr>
         <p:spPr>
-          <a:xfrm flipV="1">
-            <a:off x="9905984" y="1969628"/>
-            <a:ext cx="620857" cy="2241"/>
+          <a:xfrm flipH="1">
+            <a:off x="6096000" y="3840779"/>
+            <a:ext cx="13810" cy="364094"/>
           </a:xfrm>
           <a:prstGeom prst="straightConnector1">
             <a:avLst/>
@@ -9731,200 +10036,25 @@
       </p:cxnSp>
       <p:cxnSp>
         <p:nvCxnSpPr>
-          <p:cNvPr id="30" name="Conector recto de flecha 29">
-            <a:extLst>
-              <a:ext uri="{FF2B5EF4-FFF2-40B4-BE49-F238E27FC236}">
-                <a16:creationId xmlns:a16="http://schemas.microsoft.com/office/drawing/2014/main" id="{9841BDA8-E46F-4BE0-99E4-720E52969609}"/>
+          <p:cNvPr id="32" name="Conector: angular 31">
+            <a:extLst>
+              <a:ext uri="{FF2B5EF4-FFF2-40B4-BE49-F238E27FC236}">
+                <a16:creationId xmlns:a16="http://schemas.microsoft.com/office/drawing/2014/main" id="{E4F6BE54-427E-4663-902D-37194C97A0BA}"/>
               </a:ext>
             </a:extLst>
           </p:cNvPr>
           <p:cNvCxnSpPr>
-            <a:stCxn id="92" idx="3"/>
-            <a:endCxn id="67" idx="1"/>
+            <a:stCxn id="17" idx="3"/>
+            <a:endCxn id="64" idx="1"/>
           </p:cNvCxnSpPr>
           <p:nvPr/>
         </p:nvCxnSpPr>
         <p:spPr>
-          <a:xfrm flipV="1">
-            <a:off x="6974737" y="1969012"/>
-            <a:ext cx="389804" cy="1455"/>
-          </a:xfrm>
-          <a:prstGeom prst="straightConnector1">
-            <a:avLst/>
-          </a:prstGeom>
-          <a:ln>
-            <a:tailEnd type="triangle"/>
-          </a:ln>
-        </p:spPr>
-        <p:style>
-          <a:lnRef idx="1">
-            <a:schemeClr val="accent1"/>
-          </a:lnRef>
-          <a:fillRef idx="0">
-            <a:schemeClr val="accent1"/>
-          </a:fillRef>
-          <a:effectRef idx="0">
-            <a:schemeClr val="accent1"/>
-          </a:effectRef>
-          <a:fontRef idx="minor">
-            <a:schemeClr val="tx1"/>
-          </a:fontRef>
-        </p:style>
-      </p:cxnSp>
-      <p:cxnSp>
-        <p:nvCxnSpPr>
-          <p:cNvPr id="33" name="Conector recto de flecha 32">
-            <a:extLst>
-              <a:ext uri="{FF2B5EF4-FFF2-40B4-BE49-F238E27FC236}">
-                <a16:creationId xmlns:a16="http://schemas.microsoft.com/office/drawing/2014/main" id="{8189FD04-49DE-4C1B-BAA3-0FB5635C16EB}"/>
-              </a:ext>
-            </a:extLst>
-          </p:cNvPr>
-          <p:cNvCxnSpPr>
-            <a:stCxn id="125" idx="2"/>
-            <a:endCxn id="128" idx="0"/>
-          </p:cNvCxnSpPr>
-          <p:nvPr/>
-        </p:nvCxnSpPr>
-        <p:spPr>
-          <a:xfrm flipH="1">
-            <a:off x="6386959" y="3717299"/>
-            <a:ext cx="1" cy="309871"/>
-          </a:xfrm>
-          <a:prstGeom prst="straightConnector1">
-            <a:avLst/>
-          </a:prstGeom>
-          <a:ln>
-            <a:tailEnd type="triangle"/>
-          </a:ln>
-        </p:spPr>
-        <p:style>
-          <a:lnRef idx="1">
-            <a:schemeClr val="accent1"/>
-          </a:lnRef>
-          <a:fillRef idx="0">
-            <a:schemeClr val="accent1"/>
-          </a:fillRef>
-          <a:effectRef idx="0">
-            <a:schemeClr val="accent1"/>
-          </a:effectRef>
-          <a:fontRef idx="minor">
-            <a:schemeClr val="tx1"/>
-          </a:fontRef>
-        </p:style>
-      </p:cxnSp>
-      <p:sp>
-        <p:nvSpPr>
-          <p:cNvPr id="43" name="Diagrama de flujo: preparación 42">
-            <a:extLst>
-              <a:ext uri="{FF2B5EF4-FFF2-40B4-BE49-F238E27FC236}">
-                <a16:creationId xmlns:a16="http://schemas.microsoft.com/office/drawing/2014/main" id="{B5BE8293-1A44-40C0-8C34-9059D15C8AF4}"/>
-              </a:ext>
-            </a:extLst>
-          </p:cNvPr>
-          <p:cNvSpPr/>
-          <p:nvPr/>
-        </p:nvSpPr>
-        <p:spPr>
           <a:xfrm>
-            <a:off x="5244883" y="76880"/>
-            <a:ext cx="1581150" cy="765810"/>
-          </a:xfrm>
-          <a:prstGeom prst="flowChartPreparation">
-            <a:avLst/>
-          </a:prstGeom>
-        </p:spPr>
-        <p:style>
-          <a:lnRef idx="2">
-            <a:schemeClr val="accent6">
-              <a:shade val="50000"/>
-            </a:schemeClr>
-          </a:lnRef>
-          <a:fillRef idx="1">
-            <a:schemeClr val="accent6"/>
-          </a:fillRef>
-          <a:effectRef idx="0">
-            <a:schemeClr val="accent6"/>
-          </a:effectRef>
-          <a:fontRef idx="minor">
-            <a:schemeClr val="lt1"/>
-          </a:fontRef>
-        </p:style>
-        <p:txBody>
-          <a:bodyPr rtlCol="0" anchor="ctr"/>
-          <a:lstStyle/>
-          <a:p>
-            <a:pPr algn="ctr"/>
-            <a:r>
-              <a:rPr lang="es-PA" sz="1200" dirty="0"/>
-              <a:t>interpolacionVelocidadMetodo2</a:t>
-            </a:r>
-          </a:p>
-        </p:txBody>
-      </p:sp>
-      <p:cxnSp>
-        <p:nvCxnSpPr>
-          <p:cNvPr id="5" name="Conector recto de flecha 4">
-            <a:extLst>
-              <a:ext uri="{FF2B5EF4-FFF2-40B4-BE49-F238E27FC236}">
-                <a16:creationId xmlns:a16="http://schemas.microsoft.com/office/drawing/2014/main" id="{AD535E6B-F4DF-4DAF-954D-04A0B4A94789}"/>
-              </a:ext>
-            </a:extLst>
-          </p:cNvPr>
-          <p:cNvCxnSpPr>
-            <a:stCxn id="59" idx="3"/>
-            <a:endCxn id="43" idx="1"/>
-          </p:cNvCxnSpPr>
-          <p:nvPr/>
-        </p:nvCxnSpPr>
-        <p:spPr>
-          <a:xfrm flipV="1">
-            <a:off x="4840996" y="459785"/>
-            <a:ext cx="403887" cy="4699"/>
-          </a:xfrm>
-          <a:prstGeom prst="straightConnector1">
-            <a:avLst/>
-          </a:prstGeom>
-          <a:ln>
-            <a:tailEnd type="triangle"/>
-          </a:ln>
-        </p:spPr>
-        <p:style>
-          <a:lnRef idx="1">
-            <a:schemeClr val="accent1"/>
-          </a:lnRef>
-          <a:fillRef idx="0">
-            <a:schemeClr val="accent1"/>
-          </a:fillRef>
-          <a:effectRef idx="0">
-            <a:schemeClr val="accent1"/>
-          </a:effectRef>
-          <a:fontRef idx="minor">
-            <a:schemeClr val="tx1"/>
-          </a:fontRef>
-        </p:style>
-      </p:cxnSp>
-      <p:cxnSp>
-        <p:nvCxnSpPr>
-          <p:cNvPr id="8" name="Conector recto de flecha 7">
-            <a:extLst>
-              <a:ext uri="{FF2B5EF4-FFF2-40B4-BE49-F238E27FC236}">
-                <a16:creationId xmlns:a16="http://schemas.microsoft.com/office/drawing/2014/main" id="{6EAB8525-F1AD-457A-900C-B6E2E350AFDA}"/>
-              </a:ext>
-            </a:extLst>
-          </p:cNvPr>
-          <p:cNvCxnSpPr>
-            <a:stCxn id="43" idx="3"/>
-            <a:endCxn id="57" idx="1"/>
-          </p:cNvCxnSpPr>
-          <p:nvPr/>
-        </p:nvCxnSpPr>
-        <p:spPr>
-          <a:xfrm>
-            <a:off x="6826033" y="459785"/>
-            <a:ext cx="403888" cy="8504"/>
-          </a:xfrm>
-          <a:prstGeom prst="straightConnector1">
+            <a:off x="3147397" y="1974532"/>
+            <a:ext cx="655374" cy="1542652"/>
+          </a:xfrm>
+          <a:prstGeom prst="bentConnector3">
             <a:avLst/>
           </a:prstGeom>
           <a:ln>

</xml_diff>

<commit_message>
Se creo el MetodoPerdidaVelocidad, se creo el caso 11 y se avanzo con el caso 12
</commit_message>
<xml_diff>
--- a/datos/DiagramaAlgoritmo.pptx
+++ b/datos/DiagramaAlgoritmo.pptx
@@ -286,7 +286,7 @@
           <a:p>
             <a:fld id="{9DA5C79F-2E3E-4F45-BFFD-84CC133900D2}" type="datetimeFigureOut">
               <a:rPr lang="es-PA" smtClean="0"/>
-              <a:t>28/mar.2022</a:t>
+              <a:t>29/mar.2022</a:t>
             </a:fld>
             <a:endParaRPr lang="es-PA"/>
           </a:p>
@@ -486,7 +486,7 @@
           <a:p>
             <a:fld id="{9DA5C79F-2E3E-4F45-BFFD-84CC133900D2}" type="datetimeFigureOut">
               <a:rPr lang="es-PA" smtClean="0"/>
-              <a:t>28/mar.2022</a:t>
+              <a:t>29/mar.2022</a:t>
             </a:fld>
             <a:endParaRPr lang="es-PA"/>
           </a:p>
@@ -696,7 +696,7 @@
           <a:p>
             <a:fld id="{9DA5C79F-2E3E-4F45-BFFD-84CC133900D2}" type="datetimeFigureOut">
               <a:rPr lang="es-PA" smtClean="0"/>
-              <a:t>28/mar.2022</a:t>
+              <a:t>29/mar.2022</a:t>
             </a:fld>
             <a:endParaRPr lang="es-PA"/>
           </a:p>
@@ -896,7 +896,7 @@
           <a:p>
             <a:fld id="{9DA5C79F-2E3E-4F45-BFFD-84CC133900D2}" type="datetimeFigureOut">
               <a:rPr lang="es-PA" smtClean="0"/>
-              <a:t>28/mar.2022</a:t>
+              <a:t>29/mar.2022</a:t>
             </a:fld>
             <a:endParaRPr lang="es-PA"/>
           </a:p>
@@ -1172,7 +1172,7 @@
           <a:p>
             <a:fld id="{9DA5C79F-2E3E-4F45-BFFD-84CC133900D2}" type="datetimeFigureOut">
               <a:rPr lang="es-PA" smtClean="0"/>
-              <a:t>28/mar.2022</a:t>
+              <a:t>29/mar.2022</a:t>
             </a:fld>
             <a:endParaRPr lang="es-PA"/>
           </a:p>
@@ -1440,7 +1440,7 @@
           <a:p>
             <a:fld id="{9DA5C79F-2E3E-4F45-BFFD-84CC133900D2}" type="datetimeFigureOut">
               <a:rPr lang="es-PA" smtClean="0"/>
-              <a:t>28/mar.2022</a:t>
+              <a:t>29/mar.2022</a:t>
             </a:fld>
             <a:endParaRPr lang="es-PA"/>
           </a:p>
@@ -1855,7 +1855,7 @@
           <a:p>
             <a:fld id="{9DA5C79F-2E3E-4F45-BFFD-84CC133900D2}" type="datetimeFigureOut">
               <a:rPr lang="es-PA" smtClean="0"/>
-              <a:t>28/mar.2022</a:t>
+              <a:t>29/mar.2022</a:t>
             </a:fld>
             <a:endParaRPr lang="es-PA"/>
           </a:p>
@@ -1997,7 +1997,7 @@
           <a:p>
             <a:fld id="{9DA5C79F-2E3E-4F45-BFFD-84CC133900D2}" type="datetimeFigureOut">
               <a:rPr lang="es-PA" smtClean="0"/>
-              <a:t>28/mar.2022</a:t>
+              <a:t>29/mar.2022</a:t>
             </a:fld>
             <a:endParaRPr lang="es-PA"/>
           </a:p>
@@ -2110,7 +2110,7 @@
           <a:p>
             <a:fld id="{9DA5C79F-2E3E-4F45-BFFD-84CC133900D2}" type="datetimeFigureOut">
               <a:rPr lang="es-PA" smtClean="0"/>
-              <a:t>28/mar.2022</a:t>
+              <a:t>29/mar.2022</a:t>
             </a:fld>
             <a:endParaRPr lang="es-PA"/>
           </a:p>
@@ -2423,7 +2423,7 @@
           <a:p>
             <a:fld id="{9DA5C79F-2E3E-4F45-BFFD-84CC133900D2}" type="datetimeFigureOut">
               <a:rPr lang="es-PA" smtClean="0"/>
-              <a:t>28/mar.2022</a:t>
+              <a:t>29/mar.2022</a:t>
             </a:fld>
             <a:endParaRPr lang="es-PA"/>
           </a:p>
@@ -2712,7 +2712,7 @@
           <a:p>
             <a:fld id="{9DA5C79F-2E3E-4F45-BFFD-84CC133900D2}" type="datetimeFigureOut">
               <a:rPr lang="es-PA" smtClean="0"/>
-              <a:t>28/mar.2022</a:t>
+              <a:t>29/mar.2022</a:t>
             </a:fld>
             <a:endParaRPr lang="es-PA"/>
           </a:p>
@@ -2955,7 +2955,7 @@
           <a:p>
             <a:fld id="{9DA5C79F-2E3E-4F45-BFFD-84CC133900D2}" type="datetimeFigureOut">
               <a:rPr lang="es-PA" smtClean="0"/>
-              <a:t>28/mar.2022</a:t>
+              <a:t>29/mar.2022</a:t>
             </a:fld>
             <a:endParaRPr lang="es-PA"/>
           </a:p>

</xml_diff>